<commit_message>
Fixed axes and legends
</commit_message>
<xml_diff>
--- a/presentazione_meazzo.pptx
+++ b/presentazione_meazzo.pptx
@@ -21830,7 +21830,7 @@
                     <a:latin typeface="Cambria Math" panose="02040503050406030204" pitchFamily="18" charset="0"/>
                     <a:ea typeface="Cambria Math" panose="02040503050406030204" pitchFamily="18" charset="0"/>
                   </a:rPr>
-                  <a:t>1000</a:t>
+                  <a:t>1000 Nodes</a:t>
                 </a:r>
               </a:p>
               <a:p>
@@ -22104,6 +22104,291 @@
   <p:clrMapOvr>
     <a:masterClrMapping/>
   </p:clrMapOvr>
+  <p:timing>
+    <p:tnLst>
+      <p:par>
+        <p:cTn id="1" dur="indefinite" restart="never" nodeType="tmRoot">
+          <p:childTnLst>
+            <p:seq concurrent="1" nextAc="seek">
+              <p:cTn id="2" dur="indefinite" nodeType="mainSeq">
+                <p:childTnLst>
+                  <p:par>
+                    <p:cTn id="3" fill="hold">
+                      <p:stCondLst>
+                        <p:cond delay="indefinite"/>
+                      </p:stCondLst>
+                      <p:childTnLst>
+                        <p:par>
+                          <p:cTn id="4" fill="hold">
+                            <p:stCondLst>
+                              <p:cond delay="0"/>
+                            </p:stCondLst>
+                            <p:childTnLst>
+                              <p:par>
+                                <p:cTn id="5" presetID="2" presetClass="entr" presetSubtype="6" fill="hold" nodeType="clickEffect">
+                                  <p:stCondLst>
+                                    <p:cond delay="0"/>
+                                  </p:stCondLst>
+                                  <p:childTnLst>
+                                    <p:set>
+                                      <p:cBhvr>
+                                        <p:cTn id="6" dur="1" fill="hold">
+                                          <p:stCondLst>
+                                            <p:cond delay="0"/>
+                                          </p:stCondLst>
+                                        </p:cTn>
+                                        <p:tgtEl>
+                                          <p:spTgt spid="11"/>
+                                        </p:tgtEl>
+                                        <p:attrNameLst>
+                                          <p:attrName>style.visibility</p:attrName>
+                                        </p:attrNameLst>
+                                      </p:cBhvr>
+                                      <p:to>
+                                        <p:strVal val="visible"/>
+                                      </p:to>
+                                    </p:set>
+                                    <p:anim calcmode="lin" valueType="num">
+                                      <p:cBhvr additive="base">
+                                        <p:cTn id="7" dur="500" fill="hold"/>
+                                        <p:tgtEl>
+                                          <p:spTgt spid="11"/>
+                                        </p:tgtEl>
+                                        <p:attrNameLst>
+                                          <p:attrName>ppt_x</p:attrName>
+                                        </p:attrNameLst>
+                                      </p:cBhvr>
+                                      <p:tavLst>
+                                        <p:tav tm="0">
+                                          <p:val>
+                                            <p:strVal val="1+#ppt_w/2"/>
+                                          </p:val>
+                                        </p:tav>
+                                        <p:tav tm="100000">
+                                          <p:val>
+                                            <p:strVal val="#ppt_x"/>
+                                          </p:val>
+                                        </p:tav>
+                                      </p:tavLst>
+                                    </p:anim>
+                                    <p:anim calcmode="lin" valueType="num">
+                                      <p:cBhvr additive="base">
+                                        <p:cTn id="8" dur="500" fill="hold"/>
+                                        <p:tgtEl>
+                                          <p:spTgt spid="11"/>
+                                        </p:tgtEl>
+                                        <p:attrNameLst>
+                                          <p:attrName>ppt_y</p:attrName>
+                                        </p:attrNameLst>
+                                      </p:cBhvr>
+                                      <p:tavLst>
+                                        <p:tav tm="0">
+                                          <p:val>
+                                            <p:strVal val="1+#ppt_h/2"/>
+                                          </p:val>
+                                        </p:tav>
+                                        <p:tav tm="100000">
+                                          <p:val>
+                                            <p:strVal val="#ppt_y"/>
+                                          </p:val>
+                                        </p:tav>
+                                      </p:tavLst>
+                                    </p:anim>
+                                  </p:childTnLst>
+                                </p:cTn>
+                              </p:par>
+                            </p:childTnLst>
+                          </p:cTn>
+                        </p:par>
+                        <p:par>
+                          <p:cTn id="9" fill="hold">
+                            <p:stCondLst>
+                              <p:cond delay="500"/>
+                            </p:stCondLst>
+                            <p:childTnLst>
+                              <p:par>
+                                <p:cTn id="10" presetID="2" presetClass="entr" presetSubtype="6" fill="hold" nodeType="afterEffect">
+                                  <p:stCondLst>
+                                    <p:cond delay="0"/>
+                                  </p:stCondLst>
+                                  <p:childTnLst>
+                                    <p:set>
+                                      <p:cBhvr>
+                                        <p:cTn id="11" dur="1" fill="hold">
+                                          <p:stCondLst>
+                                            <p:cond delay="0"/>
+                                          </p:stCondLst>
+                                        </p:cTn>
+                                        <p:tgtEl>
+                                          <p:spTgt spid="12"/>
+                                        </p:tgtEl>
+                                        <p:attrNameLst>
+                                          <p:attrName>style.visibility</p:attrName>
+                                        </p:attrNameLst>
+                                      </p:cBhvr>
+                                      <p:to>
+                                        <p:strVal val="visible"/>
+                                      </p:to>
+                                    </p:set>
+                                    <p:anim calcmode="lin" valueType="num">
+                                      <p:cBhvr additive="base">
+                                        <p:cTn id="12" dur="500" fill="hold"/>
+                                        <p:tgtEl>
+                                          <p:spTgt spid="12"/>
+                                        </p:tgtEl>
+                                        <p:attrNameLst>
+                                          <p:attrName>ppt_x</p:attrName>
+                                        </p:attrNameLst>
+                                      </p:cBhvr>
+                                      <p:tavLst>
+                                        <p:tav tm="0">
+                                          <p:val>
+                                            <p:strVal val="1+#ppt_w/2"/>
+                                          </p:val>
+                                        </p:tav>
+                                        <p:tav tm="100000">
+                                          <p:val>
+                                            <p:strVal val="#ppt_x"/>
+                                          </p:val>
+                                        </p:tav>
+                                      </p:tavLst>
+                                    </p:anim>
+                                    <p:anim calcmode="lin" valueType="num">
+                                      <p:cBhvr additive="base">
+                                        <p:cTn id="13" dur="500" fill="hold"/>
+                                        <p:tgtEl>
+                                          <p:spTgt spid="12"/>
+                                        </p:tgtEl>
+                                        <p:attrNameLst>
+                                          <p:attrName>ppt_y</p:attrName>
+                                        </p:attrNameLst>
+                                      </p:cBhvr>
+                                      <p:tavLst>
+                                        <p:tav tm="0">
+                                          <p:val>
+                                            <p:strVal val="1+#ppt_h/2"/>
+                                          </p:val>
+                                        </p:tav>
+                                        <p:tav tm="100000">
+                                          <p:val>
+                                            <p:strVal val="#ppt_y"/>
+                                          </p:val>
+                                        </p:tav>
+                                      </p:tavLst>
+                                    </p:anim>
+                                  </p:childTnLst>
+                                </p:cTn>
+                              </p:par>
+                            </p:childTnLst>
+                          </p:cTn>
+                        </p:par>
+                        <p:par>
+                          <p:cTn id="14" fill="hold">
+                            <p:stCondLst>
+                              <p:cond delay="1000"/>
+                            </p:stCondLst>
+                            <p:childTnLst>
+                              <p:par>
+                                <p:cTn id="15" presetID="2" presetClass="entr" presetSubtype="6" fill="hold" nodeType="afterEffect">
+                                  <p:stCondLst>
+                                    <p:cond delay="0"/>
+                                  </p:stCondLst>
+                                  <p:childTnLst>
+                                    <p:set>
+                                      <p:cBhvr>
+                                        <p:cTn id="16" dur="1" fill="hold">
+                                          <p:stCondLst>
+                                            <p:cond delay="0"/>
+                                          </p:stCondLst>
+                                        </p:cTn>
+                                        <p:tgtEl>
+                                          <p:spTgt spid="13"/>
+                                        </p:tgtEl>
+                                        <p:attrNameLst>
+                                          <p:attrName>style.visibility</p:attrName>
+                                        </p:attrNameLst>
+                                      </p:cBhvr>
+                                      <p:to>
+                                        <p:strVal val="visible"/>
+                                      </p:to>
+                                    </p:set>
+                                    <p:anim calcmode="lin" valueType="num">
+                                      <p:cBhvr additive="base">
+                                        <p:cTn id="17" dur="500" fill="hold"/>
+                                        <p:tgtEl>
+                                          <p:spTgt spid="13"/>
+                                        </p:tgtEl>
+                                        <p:attrNameLst>
+                                          <p:attrName>ppt_x</p:attrName>
+                                        </p:attrNameLst>
+                                      </p:cBhvr>
+                                      <p:tavLst>
+                                        <p:tav tm="0">
+                                          <p:val>
+                                            <p:strVal val="1+#ppt_w/2"/>
+                                          </p:val>
+                                        </p:tav>
+                                        <p:tav tm="100000">
+                                          <p:val>
+                                            <p:strVal val="#ppt_x"/>
+                                          </p:val>
+                                        </p:tav>
+                                      </p:tavLst>
+                                    </p:anim>
+                                    <p:anim calcmode="lin" valueType="num">
+                                      <p:cBhvr additive="base">
+                                        <p:cTn id="18" dur="500" fill="hold"/>
+                                        <p:tgtEl>
+                                          <p:spTgt spid="13"/>
+                                        </p:tgtEl>
+                                        <p:attrNameLst>
+                                          <p:attrName>ppt_y</p:attrName>
+                                        </p:attrNameLst>
+                                      </p:cBhvr>
+                                      <p:tavLst>
+                                        <p:tav tm="0">
+                                          <p:val>
+                                            <p:strVal val="1+#ppt_h/2"/>
+                                          </p:val>
+                                        </p:tav>
+                                        <p:tav tm="100000">
+                                          <p:val>
+                                            <p:strVal val="#ppt_y"/>
+                                          </p:val>
+                                        </p:tav>
+                                      </p:tavLst>
+                                    </p:anim>
+                                  </p:childTnLst>
+                                </p:cTn>
+                              </p:par>
+                            </p:childTnLst>
+                          </p:cTn>
+                        </p:par>
+                      </p:childTnLst>
+                    </p:cTn>
+                  </p:par>
+                </p:childTnLst>
+              </p:cTn>
+              <p:prevCondLst>
+                <p:cond evt="onPrev" delay="0">
+                  <p:tgtEl>
+                    <p:sldTgt/>
+                  </p:tgtEl>
+                </p:cond>
+              </p:prevCondLst>
+              <p:nextCondLst>
+                <p:cond evt="onNext" delay="0">
+                  <p:tgtEl>
+                    <p:sldTgt/>
+                  </p:tgtEl>
+                </p:cond>
+              </p:nextCondLst>
+            </p:seq>
+          </p:childTnLst>
+        </p:cTn>
+      </p:par>
+    </p:tnLst>
+  </p:timing>
 </p:sld>
 </file>
 
@@ -22560,16 +22845,6 @@
             <a:pPr algn="just">
               <a:defRPr/>
             </a:pPr>
-            <a:r>
-              <a:rPr lang="it-IT" b="1" dirty="0">
-                <a:solidFill>
-                  <a:srgbClr val="003F6E"/>
-                </a:solidFill>
-                <a:latin typeface="Arial" panose="020B0604020202020204" pitchFamily="34" charset="0"/>
-                <a:cs typeface="Arial" panose="020B0604020202020204" pitchFamily="34" charset="0"/>
-              </a:rPr>
-              <a:t>An </a:t>
-            </a:r>
             <a:r>
               <a:rPr lang="it-IT" b="1" dirty="0" err="1">
                 <a:solidFill>
@@ -22833,8 +23108,8 @@
         </p:nvSpPr>
         <p:spPr>
           <a:xfrm>
-            <a:off x="549214" y="2515130"/>
-            <a:ext cx="7988418" cy="646331"/>
+            <a:off x="543497" y="2238131"/>
+            <a:ext cx="7988418" cy="923330"/>
           </a:xfrm>
           <a:prstGeom prst="rect">
             <a:avLst/>
@@ -22847,6 +23122,19 @@
           </a:bodyPr>
           <a:lstStyle/>
           <a:p>
+            <a:pPr algn="ctr"/>
+            <a:r>
+              <a:rPr lang="it-IT" b="1" dirty="0">
+                <a:solidFill>
+                  <a:srgbClr val="003F6E"/>
+                </a:solidFill>
+                <a:latin typeface="Arial" panose="020B0604020202020204" pitchFamily="34" charset="0"/>
+                <a:cs typeface="Arial" panose="020B0604020202020204" pitchFamily="34" charset="0"/>
+              </a:rPr>
+              <a:t>BUT,</a:t>
+            </a:r>
+          </a:p>
+          <a:p>
             <a:pPr algn="just"/>
             <a:r>
               <a:rPr lang="it-IT" b="1" dirty="0" err="1">
@@ -22856,27 +23144,7 @@
                 <a:latin typeface="Arial" panose="020B0604020202020204" pitchFamily="34" charset="0"/>
                 <a:cs typeface="Arial" panose="020B0604020202020204" pitchFamily="34" charset="0"/>
               </a:rPr>
-              <a:t>However</a:t>
-            </a:r>
-            <a:r>
-              <a:rPr lang="it-IT" b="1" dirty="0">
-                <a:solidFill>
-                  <a:srgbClr val="003F6E"/>
-                </a:solidFill>
-                <a:latin typeface="Arial" panose="020B0604020202020204" pitchFamily="34" charset="0"/>
-                <a:cs typeface="Arial" panose="020B0604020202020204" pitchFamily="34" charset="0"/>
-              </a:rPr>
-              <a:t>, with </a:t>
-            </a:r>
-            <a:r>
-              <a:rPr lang="it-IT" b="1" dirty="0" err="1">
-                <a:solidFill>
-                  <a:srgbClr val="003F6E"/>
-                </a:solidFill>
-                <a:latin typeface="Arial" panose="020B0604020202020204" pitchFamily="34" charset="0"/>
-                <a:cs typeface="Arial" panose="020B0604020202020204" pitchFamily="34" charset="0"/>
-              </a:rPr>
-              <a:t>today's</a:t>
+              <a:t>Today’s</a:t>
             </a:r>
             <a:r>
               <a:rPr lang="it-IT" b="1" dirty="0">
@@ -22887,26 +23155,6 @@
                 <a:cs typeface="Arial" panose="020B0604020202020204" pitchFamily="34" charset="0"/>
               </a:rPr>
               <a:t> market trend </a:t>
-            </a:r>
-            <a:r>
-              <a:rPr lang="it-IT" b="1" dirty="0" err="1">
-                <a:solidFill>
-                  <a:srgbClr val="003F6E"/>
-                </a:solidFill>
-                <a:latin typeface="Arial" panose="020B0604020202020204" pitchFamily="34" charset="0"/>
-                <a:cs typeface="Arial" panose="020B0604020202020204" pitchFamily="34" charset="0"/>
-              </a:rPr>
-              <a:t>which</a:t>
-            </a:r>
-            <a:r>
-              <a:rPr lang="it-IT" b="1" dirty="0">
-                <a:solidFill>
-                  <a:srgbClr val="003F6E"/>
-                </a:solidFill>
-                <a:latin typeface="Arial" panose="020B0604020202020204" pitchFamily="34" charset="0"/>
-                <a:cs typeface="Arial" panose="020B0604020202020204" pitchFamily="34" charset="0"/>
-              </a:rPr>
-              <a:t> </a:t>
             </a:r>
             <a:r>
               <a:rPr lang="it-IT" b="1" dirty="0" err="1">

</xml_diff>

<commit_message>
Attached eddy hyp added
</commit_message>
<xml_diff>
--- a/presentazione_meazzo.pptx
+++ b/presentazione_meazzo.pptx
@@ -20,7 +20,7 @@
     <p:sldId id="262" r:id="rId11"/>
     <p:sldId id="270" r:id="rId12"/>
     <p:sldId id="277" r:id="rId13"/>
-    <p:sldId id="299" r:id="rId14"/>
+    <p:sldId id="304" r:id="rId14"/>
     <p:sldId id="285" r:id="rId15"/>
     <p:sldId id="272" r:id="rId16"/>
     <p:sldId id="271" r:id="rId17"/>
@@ -151,7 +151,7 @@
             <p14:sldId id="262"/>
             <p14:sldId id="270"/>
             <p14:sldId id="277"/>
-            <p14:sldId id="299"/>
+            <p14:sldId id="304"/>
             <p14:sldId id="285"/>
           </p14:sldIdLst>
         </p14:section>
@@ -992,32 +992,7 @@
           <a:bodyPr/>
           <a:lstStyle/>
           <a:p>
-            <a:r>
-              <a:rPr lang="it-IT" dirty="0"/>
-              <a:t>Aggiungere slide intro su </a:t>
-            </a:r>
-            <a:r>
-              <a:rPr lang="it-IT" dirty="0" err="1"/>
-              <a:t>towsend</a:t>
-            </a:r>
-            <a:r>
-              <a:rPr lang="it-IT" dirty="0"/>
-              <a:t> con</a:t>
-            </a:r>
-          </a:p>
-          <a:p>
-            <a:r>
-              <a:rPr lang="it-IT" dirty="0"/>
-              <a:t>Funzione </a:t>
-            </a:r>
-            <a:r>
-              <a:rPr lang="it-IT" dirty="0" err="1"/>
-              <a:t>Predittore</a:t>
-            </a:r>
-            <a:r>
-              <a:rPr lang="it-IT" dirty="0"/>
-              <a:t> andamento logaritmico</a:t>
-            </a:r>
+            <a:endParaRPr lang="it-IT" dirty="0"/>
           </a:p>
         </p:txBody>
       </p:sp>
@@ -1047,7 +1022,7 @@
     </p:spTree>
     <p:extLst>
       <p:ext uri="{BB962C8B-B14F-4D97-AF65-F5344CB8AC3E}">
-        <p14:creationId xmlns:p14="http://schemas.microsoft.com/office/powerpoint/2010/main" val="3737241230"/>
+        <p14:creationId xmlns:p14="http://schemas.microsoft.com/office/powerpoint/2010/main" val="3907203179"/>
       </p:ext>
     </p:extLst>
   </p:cSld>
@@ -1492,38 +1467,25 @@
           <a:p>
             <a:r>
               <a:rPr lang="it-IT" dirty="0"/>
-              <a:t>Basato su </a:t>
-            </a:r>
-            <a:r>
-              <a:rPr lang="it-IT" dirty="0" err="1"/>
-              <a:t>ark</a:t>
-            </a:r>
-            <a:r>
-              <a:rPr lang="it-IT" dirty="0"/>
-              <a:t> a memoria distribuita,</a:t>
+              <a:t>Punto di partenza è stato codice a memoria distribuita</a:t>
             </a:r>
           </a:p>
           <a:p>
-            <a:endParaRPr lang="it-IT" dirty="0"/>
+            <a:r>
+              <a:rPr lang="it-IT" dirty="0"/>
+              <a:t>bassa efficienza parallela</a:t>
+            </a:r>
           </a:p>
           <a:p>
             <a:r>
               <a:rPr lang="it-IT" dirty="0"/>
-              <a:t>? Realizzare questo </a:t>
-            </a:r>
-            <a:r>
-              <a:rPr lang="it-IT" dirty="0" err="1"/>
-              <a:t>sys</a:t>
-            </a:r>
-            <a:r>
-              <a:rPr lang="it-IT" dirty="0"/>
-              <a:t> Efficiente e semplice?</a:t>
+              <a:t>Al fine di aumentare efficienza </a:t>
             </a:r>
           </a:p>
           <a:p>
             <a:r>
               <a:rPr lang="it-IT" dirty="0"/>
-              <a:t>MPI:</a:t>
+              <a:t>innanzitutto introdotto MPI:</a:t>
             </a:r>
           </a:p>
           <a:p>
@@ -1639,12 +1601,29 @@
           <a:p>
             <a:r>
               <a:rPr lang="it-IT" dirty="0"/>
-              <a:t>Vantaggi di questo modello di programmazione</a:t>
+              <a:t>Adozione MPI richiede apposito metodo di programmazione</a:t>
             </a:r>
           </a:p>
           <a:p>
             <a:r>
               <a:rPr lang="it-IT" dirty="0"/>
+              <a:t>1 codice 4000 </a:t>
+            </a:r>
+            <a:r>
+              <a:rPr lang="it-IT" dirty="0" err="1"/>
+              <a:t>cores</a:t>
+            </a:r>
+            <a:endParaRPr lang="it-IT" dirty="0"/>
+          </a:p>
+          <a:p>
+            <a:r>
+              <a:rPr lang="it-IT" dirty="0"/>
+              <a:t>Vantaggi di questo modello di programmazione</a:t>
+            </a:r>
+          </a:p>
+          <a:p>
+            <a:r>
+              <a:rPr lang="it-IT" dirty="0"/>
               <a:t>Principale possibilità di scalare elevato </a:t>
             </a:r>
             <a:r>
@@ -1654,6 +1633,24 @@
             <a:r>
               <a:rPr lang="it-IT" dirty="0"/>
               <a:t> nodi</a:t>
+            </a:r>
+          </a:p>
+          <a:p>
+            <a:r>
+              <a:rPr lang="it-IT" dirty="0"/>
+              <a:t>utilizzo di hardware standard rispetto a CUDA </a:t>
+            </a:r>
+          </a:p>
+          <a:p>
+            <a:r>
+              <a:rPr lang="it-IT" dirty="0"/>
+              <a:t>Svantaggi: latenza messaggi, </a:t>
+            </a:r>
+          </a:p>
+          <a:p>
+            <a:r>
+              <a:rPr lang="it-IT" dirty="0"/>
+              <a:t>dipendenza larghezza banda</a:t>
             </a:r>
           </a:p>
           <a:p>
@@ -19120,7 +19117,7 @@
         <p:spPr>
           <a:xfrm>
             <a:off x="457200" y="1968762"/>
-            <a:ext cx="5199197" cy="3899398"/>
+            <a:ext cx="5199197" cy="3899397"/>
           </a:xfrm>
           <a:prstGeom prst="rect">
             <a:avLst/>
@@ -21322,7 +21319,7 @@
         </p:blipFill>
         <p:spPr>
           <a:xfrm>
-            <a:off x="0" y="1656677"/>
+            <a:off x="0" y="1403383"/>
             <a:ext cx="4689252" cy="4194051"/>
           </a:xfrm>
           <a:prstGeom prst="rect">
@@ -21506,7 +21503,7 @@
         </p:blipFill>
         <p:spPr>
           <a:xfrm>
-            <a:off x="4454748" y="1610180"/>
+            <a:off x="4447911" y="1403383"/>
             <a:ext cx="4689252" cy="3516939"/>
           </a:xfrm>
           <a:prstGeom prst="rect">
@@ -21530,7 +21527,7 @@
         </p:nvCxnSpPr>
         <p:spPr>
           <a:xfrm flipH="1">
-            <a:off x="1495594" y="4903582"/>
+            <a:off x="1520013" y="4712800"/>
             <a:ext cx="197728" cy="447074"/>
           </a:xfrm>
           <a:prstGeom prst="straightConnector1">
@@ -21571,7 +21568,7 @@
         </p:nvCxnSpPr>
         <p:spPr>
           <a:xfrm flipH="1" flipV="1">
-            <a:off x="1488609" y="4032273"/>
+            <a:off x="1477045" y="3789301"/>
             <a:ext cx="213429" cy="485939"/>
           </a:xfrm>
           <a:prstGeom prst="straightConnector1">
@@ -21750,7 +21747,7 @@
         </p:nvSpPr>
         <p:spPr>
           <a:xfrm>
-            <a:off x="7120367" y="5202093"/>
+            <a:off x="6877299" y="5156508"/>
             <a:ext cx="1668631" cy="646331"/>
           </a:xfrm>
           <a:prstGeom prst="rect">
@@ -21809,7 +21806,7 @@
         </p:nvSpPr>
         <p:spPr>
           <a:xfrm>
-            <a:off x="5265185" y="5202093"/>
+            <a:off x="5143651" y="5150707"/>
             <a:ext cx="1279249" cy="646331"/>
           </a:xfrm>
           <a:prstGeom prst="rect">
@@ -23661,7 +23658,7 @@
         </p:nvPicPr>
         <p:blipFill>
           <a:blip r:embed="rId3">
-            <a:alphaModFix amt="20000"/>
+            <a:alphaModFix/>
           </a:blip>
           <a:stretch>
             <a:fillRect/>
@@ -23669,8 +23666,8 @@
         </p:blipFill>
         <p:spPr>
           <a:xfrm>
-            <a:off x="21740" y="1698920"/>
-            <a:ext cx="5199196" cy="3899397"/>
+            <a:off x="21740" y="2257063"/>
+            <a:ext cx="4455005" cy="3341254"/>
           </a:xfrm>
           <a:prstGeom prst="rect">
             <a:avLst/>
@@ -23752,7 +23749,7 @@
           <a:p>
             <a:r>
               <a:rPr lang="it-IT" dirty="0" err="1"/>
-              <a:t>Particular</a:t>
+              <a:t>Fluctuations</a:t>
             </a:r>
             <a:r>
               <a:rPr lang="it-IT" dirty="0"/>
@@ -23760,7 +23757,7 @@
             </a:r>
             <a:r>
               <a:rPr lang="it-IT" dirty="0" err="1"/>
-              <a:t>Fluctuations</a:t>
+              <a:t>Behaviour</a:t>
             </a:r>
             <a:r>
               <a:rPr lang="it-IT" dirty="0"/>
@@ -23768,18 +23765,125 @@
             </a:r>
             <a:r>
               <a:rPr lang="it-IT" dirty="0" err="1"/>
-              <a:t>Behaviour</a:t>
-            </a:r>
-            <a:endParaRPr lang="it-IT" dirty="0"/>
+              <a:t>at</a:t>
+            </a:r>
+            <a:r>
+              <a:rPr lang="it-IT" dirty="0"/>
+              <a:t> High Re (1/2)</a:t>
+            </a:r>
           </a:p>
         </p:txBody>
       </p:sp>
       <p:sp>
         <p:nvSpPr>
-          <p:cNvPr id="22" name="Segnaposto contenuto 2">
+          <p:cNvPr id="2" name="Rettangolo 1">
             <a:extLst>
               <a:ext uri="{FF2B5EF4-FFF2-40B4-BE49-F238E27FC236}">
-                <a16:creationId xmlns:a16="http://schemas.microsoft.com/office/drawing/2014/main" id="{A4BC135E-B203-2E41-A1A8-85A2D04427CE}"/>
+                <a16:creationId xmlns:a16="http://schemas.microsoft.com/office/drawing/2014/main" id="{26F80FC8-8FCD-FF4E-B221-8FDC1EBA7820}"/>
+              </a:ext>
+            </a:extLst>
+          </p:cNvPr>
+          <p:cNvSpPr/>
+          <p:nvPr/>
+        </p:nvSpPr>
+        <p:spPr>
+          <a:xfrm>
+            <a:off x="2166355" y="4152281"/>
+            <a:ext cx="1273080" cy="83012"/>
+          </a:xfrm>
+          <a:prstGeom prst="rect">
+            <a:avLst/>
+          </a:prstGeom>
+          <a:solidFill>
+            <a:srgbClr val="40A3FF">
+              <a:alpha val="50196"/>
+            </a:srgbClr>
+          </a:solidFill>
+          <a:ln>
+            <a:noFill/>
+          </a:ln>
+        </p:spPr>
+        <p:style>
+          <a:lnRef idx="0">
+            <a:scrgbClr r="0" g="0" b="0"/>
+          </a:lnRef>
+          <a:fillRef idx="0">
+            <a:scrgbClr r="0" g="0" b="0"/>
+          </a:fillRef>
+          <a:effectRef idx="0">
+            <a:scrgbClr r="0" g="0" b="0"/>
+          </a:effectRef>
+          <a:fontRef idx="minor">
+            <a:schemeClr val="lt1"/>
+          </a:fontRef>
+        </p:style>
+        <p:txBody>
+          <a:bodyPr rtlCol="0" anchor="ctr"/>
+          <a:lstStyle/>
+          <a:p>
+            <a:pPr algn="ctr"/>
+            <a:endParaRPr lang="it-IT"/>
+          </a:p>
+        </p:txBody>
+      </p:sp>
+      <p:sp>
+        <p:nvSpPr>
+          <p:cNvPr id="12" name="Rettangolo 11">
+            <a:extLst>
+              <a:ext uri="{FF2B5EF4-FFF2-40B4-BE49-F238E27FC236}">
+                <a16:creationId xmlns:a16="http://schemas.microsoft.com/office/drawing/2014/main" id="{7880AB1A-A4C4-3447-8A4D-EA8B26DE658D}"/>
+              </a:ext>
+            </a:extLst>
+          </p:cNvPr>
+          <p:cNvSpPr/>
+          <p:nvPr/>
+        </p:nvSpPr>
+        <p:spPr>
+          <a:xfrm>
+            <a:off x="2590435" y="2671762"/>
+            <a:ext cx="958446" cy="83012"/>
+          </a:xfrm>
+          <a:prstGeom prst="rect">
+            <a:avLst/>
+          </a:prstGeom>
+          <a:solidFill>
+            <a:srgbClr val="40A3FF">
+              <a:alpha val="50196"/>
+            </a:srgbClr>
+          </a:solidFill>
+          <a:ln>
+            <a:noFill/>
+          </a:ln>
+        </p:spPr>
+        <p:style>
+          <a:lnRef idx="0">
+            <a:scrgbClr r="0" g="0" b="0"/>
+          </a:lnRef>
+          <a:fillRef idx="0">
+            <a:scrgbClr r="0" g="0" b="0"/>
+          </a:fillRef>
+          <a:effectRef idx="0">
+            <a:scrgbClr r="0" g="0" b="0"/>
+          </a:effectRef>
+          <a:fontRef idx="minor">
+            <a:schemeClr val="lt1"/>
+          </a:fontRef>
+        </p:style>
+        <p:txBody>
+          <a:bodyPr rtlCol="0" anchor="ctr"/>
+          <a:lstStyle/>
+          <a:p>
+            <a:pPr algn="ctr"/>
+            <a:endParaRPr lang="it-IT"/>
+          </a:p>
+        </p:txBody>
+      </p:sp>
+      <p:sp>
+        <p:nvSpPr>
+          <p:cNvPr id="13" name="Segnaposto contenuto 2">
+            <a:extLst>
+              <a:ext uri="{FF2B5EF4-FFF2-40B4-BE49-F238E27FC236}">
+                <a16:creationId xmlns:a16="http://schemas.microsoft.com/office/drawing/2014/main" id="{553A6946-210A-BD49-B859-289C7299E491}"/>
               </a:ext>
             </a:extLst>
           </p:cNvPr>
@@ -23790,8 +23894,8 @@
         </p:nvSpPr>
         <p:spPr>
           <a:xfrm>
-            <a:off x="5220936" y="2375936"/>
-            <a:ext cx="3481594" cy="1471669"/>
+            <a:off x="288521" y="1512060"/>
+            <a:ext cx="8581043" cy="363040"/>
           </a:xfrm>
           <a:prstGeom prst="rect">
             <a:avLst/>
@@ -23799,7 +23903,7 @@
         </p:spPr>
         <p:txBody>
           <a:bodyPr vert="horz" lIns="91440" tIns="45720" rIns="91440" bIns="45720" rtlCol="0">
-            <a:normAutofit/>
+            <a:normAutofit lnSpcReduction="10000"/>
           </a:bodyPr>
           <a:lstStyle>
             <a:lvl1pPr marL="0" indent="0" algn="l" defTabSz="457200" rtl="0" eaLnBrk="1" latinLnBrk="0" hangingPunct="1">
@@ -23939,125 +24043,109 @@
             </a:lvl9pPr>
           </a:lstStyle>
           <a:p>
-            <a:pPr>
+            <a:pPr algn="just">
               <a:defRPr/>
             </a:pPr>
             <a:r>
-              <a:rPr lang="it-IT" b="1" dirty="0">
-                <a:solidFill>
-                  <a:srgbClr val="003F6E"/>
+              <a:rPr lang="it-IT" sz="1800" b="1" dirty="0">
+                <a:solidFill>
+                  <a:schemeClr val="tx2"/>
                 </a:solidFill>
               </a:rPr>
-              <a:t>Can </a:t>
-            </a:r>
-            <a:r>
-              <a:rPr lang="it-IT" b="1" dirty="0" err="1">
-                <a:solidFill>
-                  <a:srgbClr val="003F6E"/>
+              <a:t>How </a:t>
+            </a:r>
+            <a:r>
+              <a:rPr lang="it-IT" sz="1800" b="1" dirty="0" err="1">
+                <a:solidFill>
+                  <a:schemeClr val="tx2"/>
                 </a:solidFill>
               </a:rPr>
-              <a:t>we</a:t>
-            </a:r>
-            <a:r>
-              <a:rPr lang="it-IT" b="1" dirty="0">
-                <a:solidFill>
-                  <a:srgbClr val="003F6E"/>
+              <a:t>does</a:t>
+            </a:r>
+            <a:r>
+              <a:rPr lang="it-IT" sz="1800" b="1" dirty="0">
+                <a:solidFill>
+                  <a:schemeClr val="tx2"/>
                 </a:solidFill>
               </a:rPr>
-              <a:t> spot </a:t>
-            </a:r>
-            <a:r>
-              <a:rPr lang="it-IT" b="1" dirty="0" err="1">
-                <a:solidFill>
-                  <a:srgbClr val="003F6E"/>
+              <a:t> the high Re </a:t>
+            </a:r>
+            <a:r>
+              <a:rPr lang="it-IT" sz="1800" b="1" dirty="0" err="1">
+                <a:solidFill>
+                  <a:schemeClr val="tx2"/>
                 </a:solidFill>
               </a:rPr>
-              <a:t>particular</a:t>
-            </a:r>
-            <a:r>
-              <a:rPr lang="it-IT" b="1" dirty="0">
-                <a:solidFill>
-                  <a:srgbClr val="003F6E"/>
+              <a:t>condition</a:t>
+            </a:r>
+            <a:r>
+              <a:rPr lang="it-IT" sz="1800" b="1" dirty="0">
+                <a:solidFill>
+                  <a:schemeClr val="tx2"/>
                 </a:solidFill>
               </a:rPr>
               <a:t> </a:t>
             </a:r>
             <a:r>
-              <a:rPr lang="it-IT" b="1" dirty="0" err="1">
-                <a:solidFill>
-                  <a:srgbClr val="003F6E"/>
+              <a:rPr lang="it-IT" sz="1800" b="1" dirty="0" err="1">
+                <a:solidFill>
+                  <a:schemeClr val="tx2"/>
                 </a:solidFill>
               </a:rPr>
-              <a:t>behaviours</a:t>
-            </a:r>
-            <a:r>
-              <a:rPr lang="it-IT" b="1" dirty="0">
-                <a:solidFill>
-                  <a:srgbClr val="003F6E"/>
+              <a:t>modify</a:t>
+            </a:r>
+            <a:r>
+              <a:rPr lang="it-IT" sz="1800" b="1" dirty="0">
+                <a:solidFill>
+                  <a:schemeClr val="tx2"/>
                 </a:solidFill>
               </a:rPr>
               <a:t> </a:t>
             </a:r>
             <a:r>
-              <a:rPr lang="it-IT" b="1" dirty="0" err="1">
-                <a:solidFill>
-                  <a:srgbClr val="003F6E"/>
+              <a:rPr lang="it-IT" sz="1800" b="1" dirty="0" err="1">
+                <a:solidFill>
+                  <a:schemeClr val="tx2"/>
                 </a:solidFill>
               </a:rPr>
-              <a:t>also</a:t>
-            </a:r>
-            <a:r>
-              <a:rPr lang="it-IT" b="1" dirty="0">
-                <a:solidFill>
-                  <a:srgbClr val="003F6E"/>
-                </a:solidFill>
-              </a:rPr>
-              <a:t> in </a:t>
-            </a:r>
-            <a:r>
-              <a:rPr lang="it-IT" b="1" dirty="0" err="1">
-                <a:solidFill>
-                  <a:srgbClr val="003F6E"/>
-                </a:solidFill>
-              </a:rPr>
-              <a:t>streamwise</a:t>
-            </a:r>
-            <a:r>
-              <a:rPr lang="it-IT" b="1" dirty="0">
-                <a:solidFill>
-                  <a:srgbClr val="003F6E"/>
-                </a:solidFill>
-              </a:rPr>
-              <a:t> and </a:t>
-            </a:r>
-            <a:r>
-              <a:rPr lang="it-IT" b="1" dirty="0" err="1">
-                <a:solidFill>
-                  <a:srgbClr val="003F6E"/>
-                </a:solidFill>
-              </a:rPr>
-              <a:t>spanwise</a:t>
-            </a:r>
-            <a:r>
-              <a:rPr lang="it-IT" b="1" dirty="0">
-                <a:solidFill>
-                  <a:srgbClr val="003F6E"/>
+              <a:t>our</a:t>
+            </a:r>
+            <a:r>
+              <a:rPr lang="it-IT" sz="1800" b="1" dirty="0">
+                <a:solidFill>
+                  <a:schemeClr val="tx2"/>
                 </a:solidFill>
               </a:rPr>
               <a:t> </a:t>
             </a:r>
             <a:r>
-              <a:rPr lang="it-IT" b="1" dirty="0" err="1">
-                <a:solidFill>
-                  <a:srgbClr val="003F6E"/>
+              <a:rPr lang="it-IT" sz="1800" b="1" dirty="0" err="1">
+                <a:solidFill>
+                  <a:schemeClr val="tx2"/>
                 </a:solidFill>
               </a:rPr>
               <a:t>fluctuations</a:t>
             </a:r>
             <a:r>
-              <a:rPr lang="it-IT" b="1" dirty="0">
-                <a:solidFill>
-                  <a:srgbClr val="003F6E"/>
+              <a:rPr lang="it-IT" sz="1800" b="1" dirty="0">
+                <a:solidFill>
+                  <a:schemeClr val="tx2"/>
+                </a:solidFill>
+              </a:rPr>
+              <a:t> </a:t>
+            </a:r>
+            <a:r>
+              <a:rPr lang="it-IT" sz="1800" b="1" dirty="0" err="1">
+                <a:solidFill>
+                  <a:schemeClr val="tx2"/>
+                </a:solidFill>
+              </a:rPr>
+              <a:t>profiles</a:t>
+            </a:r>
+            <a:r>
+              <a:rPr lang="it-IT" sz="1800" b="1" dirty="0">
+                <a:solidFill>
+                  <a:schemeClr val="tx2"/>
                 </a:solidFill>
               </a:rPr>
               <a:t>?</a:t>
@@ -24065,10 +24153,1326 @@
           </a:p>
         </p:txBody>
       </p:sp>
+      <p:sp>
+        <p:nvSpPr>
+          <p:cNvPr id="14" name="CasellaDiTesto 13">
+            <a:extLst>
+              <a:ext uri="{FF2B5EF4-FFF2-40B4-BE49-F238E27FC236}">
+                <a16:creationId xmlns:a16="http://schemas.microsoft.com/office/drawing/2014/main" id="{FCB0CC9B-3C2D-C94C-8DCE-3E0E024730E2}"/>
+              </a:ext>
+            </a:extLst>
+          </p:cNvPr>
+          <p:cNvSpPr txBox="1"/>
+          <p:nvPr/>
+        </p:nvSpPr>
+        <p:spPr>
+          <a:xfrm>
+            <a:off x="4476745" y="2178750"/>
+            <a:ext cx="4480250" cy="369332"/>
+          </a:xfrm>
+          <a:prstGeom prst="rect">
+            <a:avLst/>
+          </a:prstGeom>
+          <a:noFill/>
+        </p:spPr>
+        <p:txBody>
+          <a:bodyPr wrap="square" rtlCol="0">
+            <a:spAutoFit/>
+          </a:bodyPr>
+          <a:lstStyle/>
+          <a:p>
+            <a:pPr algn="just"/>
+            <a:r>
+              <a:rPr lang="it-IT" b="1" dirty="0" err="1">
+                <a:solidFill>
+                  <a:schemeClr val="tx2"/>
+                </a:solidFill>
+                <a:latin typeface="Arial" panose="020B0604020202020204" pitchFamily="34" charset="0"/>
+                <a:cs typeface="Arial" panose="020B0604020202020204" pitchFamily="34" charset="0"/>
+              </a:rPr>
+              <a:t>Townsend’s</a:t>
+            </a:r>
+            <a:r>
+              <a:rPr lang="it-IT" b="1" dirty="0">
+                <a:solidFill>
+                  <a:schemeClr val="tx2"/>
+                </a:solidFill>
+                <a:latin typeface="Arial" panose="020B0604020202020204" pitchFamily="34" charset="0"/>
+                <a:cs typeface="Arial" panose="020B0604020202020204" pitchFamily="34" charset="0"/>
+              </a:rPr>
+              <a:t> </a:t>
+            </a:r>
+            <a:r>
+              <a:rPr lang="it-IT" b="1" dirty="0" err="1">
+                <a:solidFill>
+                  <a:schemeClr val="tx2"/>
+                </a:solidFill>
+                <a:latin typeface="Arial" panose="020B0604020202020204" pitchFamily="34" charset="0"/>
+                <a:cs typeface="Arial" panose="020B0604020202020204" pitchFamily="34" charset="0"/>
+              </a:rPr>
+              <a:t>attached</a:t>
+            </a:r>
+            <a:r>
+              <a:rPr lang="it-IT" b="1" dirty="0">
+                <a:solidFill>
+                  <a:schemeClr val="tx2"/>
+                </a:solidFill>
+                <a:latin typeface="Arial" panose="020B0604020202020204" pitchFamily="34" charset="0"/>
+                <a:cs typeface="Arial" panose="020B0604020202020204" pitchFamily="34" charset="0"/>
+              </a:rPr>
+              <a:t> </a:t>
+            </a:r>
+            <a:r>
+              <a:rPr lang="it-IT" b="1" dirty="0" err="1">
+                <a:solidFill>
+                  <a:schemeClr val="tx2"/>
+                </a:solidFill>
+                <a:latin typeface="Arial" panose="020B0604020202020204" pitchFamily="34" charset="0"/>
+                <a:cs typeface="Arial" panose="020B0604020202020204" pitchFamily="34" charset="0"/>
+              </a:rPr>
+              <a:t>eddy</a:t>
+            </a:r>
+            <a:r>
+              <a:rPr lang="it-IT" b="1" dirty="0">
+                <a:solidFill>
+                  <a:schemeClr val="tx2"/>
+                </a:solidFill>
+                <a:latin typeface="Arial" panose="020B0604020202020204" pitchFamily="34" charset="0"/>
+                <a:cs typeface="Arial" panose="020B0604020202020204" pitchFamily="34" charset="0"/>
+              </a:rPr>
+              <a:t> </a:t>
+            </a:r>
+            <a:r>
+              <a:rPr lang="it-IT" b="1" dirty="0" err="1">
+                <a:solidFill>
+                  <a:schemeClr val="tx2"/>
+                </a:solidFill>
+                <a:latin typeface="Arial" panose="020B0604020202020204" pitchFamily="34" charset="0"/>
+                <a:cs typeface="Arial" panose="020B0604020202020204" pitchFamily="34" charset="0"/>
+              </a:rPr>
+              <a:t>hypothesis</a:t>
+            </a:r>
+            <a:r>
+              <a:rPr lang="it-IT" b="1" dirty="0">
+                <a:solidFill>
+                  <a:schemeClr val="tx2"/>
+                </a:solidFill>
+                <a:latin typeface="Arial" panose="020B0604020202020204" pitchFamily="34" charset="0"/>
+                <a:cs typeface="Arial" panose="020B0604020202020204" pitchFamily="34" charset="0"/>
+              </a:rPr>
+              <a:t>:</a:t>
+            </a:r>
+          </a:p>
+        </p:txBody>
+      </p:sp>
+      <p:sp>
+        <p:nvSpPr>
+          <p:cNvPr id="3" name="CasellaDiTesto 2">
+            <a:extLst>
+              <a:ext uri="{FF2B5EF4-FFF2-40B4-BE49-F238E27FC236}">
+                <a16:creationId xmlns:a16="http://schemas.microsoft.com/office/drawing/2014/main" id="{FCB2BB8C-F4D7-BF48-9B49-8852853B92FC}"/>
+              </a:ext>
+            </a:extLst>
+          </p:cNvPr>
+          <p:cNvSpPr txBox="1"/>
+          <p:nvPr/>
+        </p:nvSpPr>
+        <p:spPr>
+          <a:xfrm>
+            <a:off x="4476745" y="2515943"/>
+            <a:ext cx="4392819" cy="1703030"/>
+          </a:xfrm>
+          <a:prstGeom prst="rect">
+            <a:avLst/>
+          </a:prstGeom>
+          <a:noFill/>
+        </p:spPr>
+        <p:txBody>
+          <a:bodyPr wrap="square" rtlCol="0">
+            <a:spAutoFit/>
+          </a:bodyPr>
+          <a:lstStyle/>
+          <a:p>
+            <a:pPr marL="285750" indent="-285750" algn="just">
+              <a:lnSpc>
+                <a:spcPct val="150000"/>
+              </a:lnSpc>
+              <a:buFont typeface="Arial" panose="020B0604020202020204" pitchFamily="34" charset="0"/>
+              <a:buChar char="•"/>
+            </a:pPr>
+            <a:r>
+              <a:rPr lang="it-IT" b="1" dirty="0" err="1">
+                <a:solidFill>
+                  <a:schemeClr val="tx2"/>
+                </a:solidFill>
+                <a:latin typeface="Arial" panose="020B0604020202020204" pitchFamily="34" charset="0"/>
+                <a:cs typeface="Arial" panose="020B0604020202020204" pitchFamily="34" charset="0"/>
+              </a:rPr>
+              <a:t>Logarithmic</a:t>
+            </a:r>
+            <a:r>
+              <a:rPr lang="it-IT" b="1" dirty="0">
+                <a:solidFill>
+                  <a:schemeClr val="tx2"/>
+                </a:solidFill>
+                <a:latin typeface="Arial" panose="020B0604020202020204" pitchFamily="34" charset="0"/>
+                <a:cs typeface="Arial" panose="020B0604020202020204" pitchFamily="34" charset="0"/>
+              </a:rPr>
+              <a:t> </a:t>
+            </a:r>
+            <a:r>
+              <a:rPr lang="it-IT" b="1" dirty="0" err="1">
+                <a:solidFill>
+                  <a:schemeClr val="tx2"/>
+                </a:solidFill>
+                <a:latin typeface="Arial" panose="020B0604020202020204" pitchFamily="34" charset="0"/>
+                <a:cs typeface="Arial" panose="020B0604020202020204" pitchFamily="34" charset="0"/>
+              </a:rPr>
+              <a:t>region</a:t>
+            </a:r>
+            <a:endParaRPr lang="it-IT" b="1" dirty="0">
+              <a:solidFill>
+                <a:schemeClr val="tx2"/>
+              </a:solidFill>
+              <a:latin typeface="Arial" panose="020B0604020202020204" pitchFamily="34" charset="0"/>
+              <a:cs typeface="Arial" panose="020B0604020202020204" pitchFamily="34" charset="0"/>
+            </a:endParaRPr>
+          </a:p>
+          <a:p>
+            <a:pPr marL="285750" indent="-285750" algn="just">
+              <a:lnSpc>
+                <a:spcPct val="150000"/>
+              </a:lnSpc>
+              <a:buFont typeface="Arial" panose="020B0604020202020204" pitchFamily="34" charset="0"/>
+              <a:buChar char="•"/>
+            </a:pPr>
+            <a:r>
+              <a:rPr lang="it-IT" b="1" dirty="0" err="1">
+                <a:solidFill>
+                  <a:schemeClr val="tx2"/>
+                </a:solidFill>
+                <a:latin typeface="Arial" panose="020B0604020202020204" pitchFamily="34" charset="0"/>
+                <a:cs typeface="Arial" panose="020B0604020202020204" pitchFamily="34" charset="0"/>
+              </a:rPr>
+              <a:t>Hierarchy</a:t>
+            </a:r>
+            <a:r>
+              <a:rPr lang="it-IT" b="1" dirty="0">
+                <a:solidFill>
+                  <a:schemeClr val="tx2"/>
+                </a:solidFill>
+                <a:latin typeface="Arial" panose="020B0604020202020204" pitchFamily="34" charset="0"/>
+                <a:cs typeface="Arial" panose="020B0604020202020204" pitchFamily="34" charset="0"/>
+              </a:rPr>
+              <a:t> of self-</a:t>
+            </a:r>
+            <a:r>
+              <a:rPr lang="it-IT" b="1" dirty="0" err="1">
+                <a:solidFill>
+                  <a:schemeClr val="tx2"/>
+                </a:solidFill>
+                <a:latin typeface="Arial" panose="020B0604020202020204" pitchFamily="34" charset="0"/>
+                <a:cs typeface="Arial" panose="020B0604020202020204" pitchFamily="34" charset="0"/>
+              </a:rPr>
+              <a:t>similar</a:t>
+            </a:r>
+            <a:r>
+              <a:rPr lang="it-IT" b="1" dirty="0">
+                <a:solidFill>
+                  <a:schemeClr val="tx2"/>
+                </a:solidFill>
+                <a:latin typeface="Arial" panose="020B0604020202020204" pitchFamily="34" charset="0"/>
+                <a:cs typeface="Arial" panose="020B0604020202020204" pitchFamily="34" charset="0"/>
+              </a:rPr>
+              <a:t> </a:t>
+            </a:r>
+            <a:r>
+              <a:rPr lang="it-IT" b="1" dirty="0" err="1">
+                <a:solidFill>
+                  <a:schemeClr val="tx2"/>
+                </a:solidFill>
+                <a:latin typeface="Arial" panose="020B0604020202020204" pitchFamily="34" charset="0"/>
+                <a:cs typeface="Arial" panose="020B0604020202020204" pitchFamily="34" charset="0"/>
+              </a:rPr>
+              <a:t>eddies</a:t>
+            </a:r>
+            <a:endParaRPr lang="it-IT" b="1" dirty="0">
+              <a:solidFill>
+                <a:schemeClr val="tx2"/>
+              </a:solidFill>
+              <a:latin typeface="Arial" panose="020B0604020202020204" pitchFamily="34" charset="0"/>
+              <a:cs typeface="Arial" panose="020B0604020202020204" pitchFamily="34" charset="0"/>
+            </a:endParaRPr>
+          </a:p>
+          <a:p>
+            <a:pPr marL="285750" indent="-285750" algn="just">
+              <a:lnSpc>
+                <a:spcPct val="150000"/>
+              </a:lnSpc>
+              <a:buFont typeface="Arial" panose="020B0604020202020204" pitchFamily="34" charset="0"/>
+              <a:buChar char="•"/>
+            </a:pPr>
+            <a:r>
+              <a:rPr lang="it-IT" b="1" dirty="0" err="1">
+                <a:solidFill>
+                  <a:schemeClr val="tx2"/>
+                </a:solidFill>
+                <a:latin typeface="Arial" panose="020B0604020202020204" pitchFamily="34" charset="0"/>
+                <a:cs typeface="Arial" panose="020B0604020202020204" pitchFamily="34" charset="0"/>
+              </a:rPr>
+              <a:t>Velocity</a:t>
+            </a:r>
+            <a:r>
+              <a:rPr lang="it-IT" b="1" dirty="0">
+                <a:solidFill>
+                  <a:schemeClr val="tx2"/>
+                </a:solidFill>
+                <a:latin typeface="Arial" panose="020B0604020202020204" pitchFamily="34" charset="0"/>
+                <a:cs typeface="Arial" panose="020B0604020202020204" pitchFamily="34" charset="0"/>
+              </a:rPr>
+              <a:t> </a:t>
+            </a:r>
+            <a:r>
+              <a:rPr lang="it-IT" b="1" dirty="0" err="1">
+                <a:solidFill>
+                  <a:schemeClr val="tx2"/>
+                </a:solidFill>
+                <a:latin typeface="Arial" panose="020B0604020202020204" pitchFamily="34" charset="0"/>
+                <a:cs typeface="Arial" panose="020B0604020202020204" pitchFamily="34" charset="0"/>
+              </a:rPr>
+              <a:t>field</a:t>
+            </a:r>
+            <a:r>
+              <a:rPr lang="it-IT" b="1" dirty="0">
+                <a:solidFill>
+                  <a:schemeClr val="tx2"/>
+                </a:solidFill>
+                <a:latin typeface="Arial" panose="020B0604020202020204" pitchFamily="34" charset="0"/>
+                <a:cs typeface="Arial" panose="020B0604020202020204" pitchFamily="34" charset="0"/>
+              </a:rPr>
+              <a:t> </a:t>
+            </a:r>
+            <a:r>
+              <a:rPr lang="it-IT" b="1" dirty="0" err="1">
+                <a:solidFill>
+                  <a:schemeClr val="tx2"/>
+                </a:solidFill>
+                <a:latin typeface="Arial" panose="020B0604020202020204" pitchFamily="34" charset="0"/>
+                <a:cs typeface="Arial" panose="020B0604020202020204" pitchFamily="34" charset="0"/>
+              </a:rPr>
+              <a:t>extent</a:t>
+            </a:r>
+            <a:r>
+              <a:rPr lang="it-IT" b="1" dirty="0">
+                <a:solidFill>
+                  <a:schemeClr val="tx2"/>
+                </a:solidFill>
+                <a:latin typeface="Arial" panose="020B0604020202020204" pitchFamily="34" charset="0"/>
+                <a:cs typeface="Arial" panose="020B0604020202020204" pitchFamily="34" charset="0"/>
+              </a:rPr>
+              <a:t> to the </a:t>
+            </a:r>
+            <a:r>
+              <a:rPr lang="it-IT" b="1" dirty="0" err="1">
+                <a:solidFill>
+                  <a:schemeClr val="tx2"/>
+                </a:solidFill>
+                <a:latin typeface="Arial" panose="020B0604020202020204" pitchFamily="34" charset="0"/>
+                <a:cs typeface="Arial" panose="020B0604020202020204" pitchFamily="34" charset="0"/>
+              </a:rPr>
+              <a:t>wall</a:t>
+            </a:r>
+            <a:endParaRPr lang="it-IT" b="1" dirty="0">
+              <a:solidFill>
+                <a:schemeClr val="tx2"/>
+              </a:solidFill>
+              <a:latin typeface="Arial" panose="020B0604020202020204" pitchFamily="34" charset="0"/>
+              <a:cs typeface="Arial" panose="020B0604020202020204" pitchFamily="34" charset="0"/>
+            </a:endParaRPr>
+          </a:p>
+          <a:p>
+            <a:pPr marL="285750" indent="-285750" algn="just">
+              <a:lnSpc>
+                <a:spcPct val="150000"/>
+              </a:lnSpc>
+              <a:buFont typeface="Arial" panose="020B0604020202020204" pitchFamily="34" charset="0"/>
+              <a:buChar char="•"/>
+            </a:pPr>
+            <a:r>
+              <a:rPr lang="it-IT" b="1" dirty="0">
+                <a:solidFill>
+                  <a:schemeClr val="tx2"/>
+                </a:solidFill>
+                <a:latin typeface="Arial" panose="020B0604020202020204" pitchFamily="34" charset="0"/>
+                <a:cs typeface="Arial" panose="020B0604020202020204" pitchFamily="34" charset="0"/>
+              </a:rPr>
+              <a:t>Eddy </a:t>
+            </a:r>
+            <a:r>
+              <a:rPr lang="it-IT" b="1" dirty="0" err="1">
+                <a:solidFill>
+                  <a:schemeClr val="tx2"/>
+                </a:solidFill>
+                <a:latin typeface="Arial" panose="020B0604020202020204" pitchFamily="34" charset="0"/>
+                <a:cs typeface="Arial" panose="020B0604020202020204" pitchFamily="34" charset="0"/>
+              </a:rPr>
+              <a:t>size</a:t>
+            </a:r>
+            <a:r>
+              <a:rPr lang="it-IT" b="1" dirty="0">
+                <a:solidFill>
+                  <a:schemeClr val="tx2"/>
+                </a:solidFill>
+                <a:latin typeface="Arial" panose="020B0604020202020204" pitchFamily="34" charset="0"/>
+                <a:cs typeface="Arial" panose="020B0604020202020204" pitchFamily="34" charset="0"/>
+              </a:rPr>
+              <a:t> </a:t>
+            </a:r>
+            <a:r>
+              <a:rPr lang="it-IT" b="1" dirty="0" err="1">
+                <a:solidFill>
+                  <a:schemeClr val="tx2"/>
+                </a:solidFill>
+                <a:latin typeface="Arial" panose="020B0604020202020204" pitchFamily="34" charset="0"/>
+                <a:cs typeface="Arial" panose="020B0604020202020204" pitchFamily="34" charset="0"/>
+              </a:rPr>
+              <a:t>scales</a:t>
+            </a:r>
+            <a:r>
+              <a:rPr lang="it-IT" b="1" dirty="0">
+                <a:solidFill>
+                  <a:schemeClr val="tx2"/>
+                </a:solidFill>
+                <a:latin typeface="Arial" panose="020B0604020202020204" pitchFamily="34" charset="0"/>
+                <a:cs typeface="Arial" panose="020B0604020202020204" pitchFamily="34" charset="0"/>
+              </a:rPr>
+              <a:t> with </a:t>
+            </a:r>
+            <a:r>
+              <a:rPr lang="it-IT" b="1" dirty="0" err="1">
+                <a:solidFill>
+                  <a:schemeClr val="tx2"/>
+                </a:solidFill>
+                <a:latin typeface="Arial" panose="020B0604020202020204" pitchFamily="34" charset="0"/>
+                <a:cs typeface="Arial" panose="020B0604020202020204" pitchFamily="34" charset="0"/>
+              </a:rPr>
+              <a:t>wall</a:t>
+            </a:r>
+            <a:r>
+              <a:rPr lang="it-IT" b="1" dirty="0">
+                <a:solidFill>
+                  <a:schemeClr val="tx2"/>
+                </a:solidFill>
+                <a:latin typeface="Arial" panose="020B0604020202020204" pitchFamily="34" charset="0"/>
+                <a:cs typeface="Arial" panose="020B0604020202020204" pitchFamily="34" charset="0"/>
+              </a:rPr>
+              <a:t> </a:t>
+            </a:r>
+            <a:r>
+              <a:rPr lang="it-IT" b="1" dirty="0" err="1">
+                <a:solidFill>
+                  <a:schemeClr val="tx2"/>
+                </a:solidFill>
+                <a:latin typeface="Arial" panose="020B0604020202020204" pitchFamily="34" charset="0"/>
+                <a:cs typeface="Arial" panose="020B0604020202020204" pitchFamily="34" charset="0"/>
+              </a:rPr>
+              <a:t>distance</a:t>
+            </a:r>
+            <a:endParaRPr lang="it-IT" b="1" dirty="0">
+              <a:solidFill>
+                <a:schemeClr val="tx2"/>
+              </a:solidFill>
+              <a:latin typeface="Arial" panose="020B0604020202020204" pitchFamily="34" charset="0"/>
+              <a:cs typeface="Arial" panose="020B0604020202020204" pitchFamily="34" charset="0"/>
+            </a:endParaRPr>
+          </a:p>
+        </p:txBody>
+      </p:sp>
+      <mc:AlternateContent xmlns:mc="http://schemas.openxmlformats.org/markup-compatibility/2006">
+        <mc:Choice xmlns:a14="http://schemas.microsoft.com/office/drawing/2010/main" Requires="a14">
+          <p:sp>
+            <p:nvSpPr>
+              <p:cNvPr id="4" name="CasellaDiTesto 3">
+                <a:extLst>
+                  <a:ext uri="{FF2B5EF4-FFF2-40B4-BE49-F238E27FC236}">
+                    <a16:creationId xmlns:a16="http://schemas.microsoft.com/office/drawing/2014/main" id="{DA72DDD2-BD2B-C54B-BE2E-3E052477072F}"/>
+                  </a:ext>
+                </a:extLst>
+              </p:cNvPr>
+              <p:cNvSpPr txBox="1"/>
+              <p:nvPr/>
+            </p:nvSpPr>
+            <p:spPr>
+              <a:xfrm>
+                <a:off x="5119780" y="4409954"/>
+                <a:ext cx="3106748" cy="1360309"/>
+              </a:xfrm>
+              <a:prstGeom prst="rect">
+                <a:avLst/>
+              </a:prstGeom>
+              <a:noFill/>
+            </p:spPr>
+            <p:txBody>
+              <a:bodyPr wrap="none" rtlCol="0">
+                <a:spAutoFit/>
+              </a:bodyPr>
+              <a:lstStyle/>
+              <a:p>
+                <a14:m>
+                  <m:oMathPara xmlns:m="http://schemas.openxmlformats.org/officeDocument/2006/math">
+                    <m:oMathParaPr>
+                      <m:jc m:val="centerGroup"/>
+                    </m:oMathParaPr>
+                    <m:oMath xmlns:m="http://schemas.openxmlformats.org/officeDocument/2006/math">
+                      <m:d>
+                        <m:dPr>
+                          <m:begChr m:val="{"/>
+                          <m:endChr m:val=""/>
+                          <m:ctrlPr>
+                            <a:rPr lang="it-IT" b="1" i="1" smtClean="0">
+                              <a:solidFill>
+                                <a:schemeClr val="tx2"/>
+                              </a:solidFill>
+                              <a:latin typeface="Cambria Math" panose="02040503050406030204" pitchFamily="18" charset="0"/>
+                              <a:cs typeface="Arial" panose="020B0604020202020204" pitchFamily="34" charset="0"/>
+                            </a:rPr>
+                          </m:ctrlPr>
+                        </m:dPr>
+                        <m:e>
+                          <m:eqArr>
+                            <m:eqArrPr>
+                              <m:ctrlPr>
+                                <a:rPr lang="it-IT" b="1" i="1" smtClean="0">
+                                  <a:solidFill>
+                                    <a:schemeClr val="tx2"/>
+                                  </a:solidFill>
+                                  <a:latin typeface="Cambria Math" panose="02040503050406030204" pitchFamily="18" charset="0"/>
+                                  <a:cs typeface="Arial" panose="020B0604020202020204" pitchFamily="34" charset="0"/>
+                                </a:rPr>
+                              </m:ctrlPr>
+                            </m:eqArrPr>
+                            <m:e>
+                              <m:sSup>
+                                <m:sSupPr>
+                                  <m:ctrlPr>
+                                    <a:rPr lang="it-IT" b="1" i="1" smtClean="0">
+                                      <a:solidFill>
+                                        <a:schemeClr val="tx2"/>
+                                      </a:solidFill>
+                                      <a:latin typeface="Cambria Math" panose="02040503050406030204" pitchFamily="18" charset="0"/>
+                                      <a:cs typeface="Arial" panose="020B0604020202020204" pitchFamily="34" charset="0"/>
+                                    </a:rPr>
+                                  </m:ctrlPr>
+                                </m:sSupPr>
+                                <m:e>
+                                  <m:d>
+                                    <m:dPr>
+                                      <m:begChr m:val="⟨"/>
+                                      <m:endChr m:val="⟩"/>
+                                      <m:ctrlPr>
+                                        <a:rPr lang="it-IT" b="1" i="1">
+                                          <a:solidFill>
+                                            <a:schemeClr val="tx2"/>
+                                          </a:solidFill>
+                                          <a:latin typeface="Cambria Math" panose="02040503050406030204" pitchFamily="18" charset="0"/>
+                                          <a:cs typeface="Arial" panose="020B0604020202020204" pitchFamily="34" charset="0"/>
+                                        </a:rPr>
+                                      </m:ctrlPr>
+                                    </m:dPr>
+                                    <m:e>
+                                      <m:r>
+                                        <a:rPr lang="it-IT" b="1" i="1">
+                                          <a:solidFill>
+                                            <a:schemeClr val="tx2"/>
+                                          </a:solidFill>
+                                          <a:latin typeface="Cambria Math" panose="02040503050406030204" pitchFamily="18" charset="0"/>
+                                          <a:cs typeface="Arial" panose="020B0604020202020204" pitchFamily="34" charset="0"/>
+                                        </a:rPr>
+                                        <m:t>𝒗</m:t>
+                                      </m:r>
+                                      <m:r>
+                                        <a:rPr lang="it-IT" b="1" i="1" smtClean="0">
+                                          <a:solidFill>
+                                            <a:schemeClr val="tx2"/>
+                                          </a:solidFill>
+                                          <a:latin typeface="Cambria Math" panose="02040503050406030204" pitchFamily="18" charset="0"/>
+                                          <a:cs typeface="Arial" panose="020B0604020202020204" pitchFamily="34" charset="0"/>
+                                        </a:rPr>
+                                        <m:t>′</m:t>
+                                      </m:r>
+                                      <m:r>
+                                        <a:rPr lang="it-IT" b="1" i="1">
+                                          <a:solidFill>
+                                            <a:schemeClr val="tx2"/>
+                                          </a:solidFill>
+                                          <a:latin typeface="Cambria Math" panose="02040503050406030204" pitchFamily="18" charset="0"/>
+                                          <a:cs typeface="Arial" panose="020B0604020202020204" pitchFamily="34" charset="0"/>
+                                        </a:rPr>
+                                        <m:t>𝒗</m:t>
+                                      </m:r>
+                                      <m:r>
+                                        <a:rPr lang="it-IT" b="1" i="1" smtClean="0">
+                                          <a:solidFill>
+                                            <a:schemeClr val="tx2"/>
+                                          </a:solidFill>
+                                          <a:latin typeface="Cambria Math" panose="02040503050406030204" pitchFamily="18" charset="0"/>
+                                          <a:cs typeface="Arial" panose="020B0604020202020204" pitchFamily="34" charset="0"/>
+                                        </a:rPr>
+                                        <m:t>′</m:t>
+                                      </m:r>
+                                    </m:e>
+                                  </m:d>
+                                </m:e>
+                                <m:sup>
+                                  <m:r>
+                                    <a:rPr lang="it-IT" b="1" i="1" smtClean="0">
+                                      <a:solidFill>
+                                        <a:schemeClr val="tx2"/>
+                                      </a:solidFill>
+                                      <a:latin typeface="Cambria Math" panose="02040503050406030204" pitchFamily="18" charset="0"/>
+                                      <a:cs typeface="Arial" panose="020B0604020202020204" pitchFamily="34" charset="0"/>
+                                    </a:rPr>
+                                    <m:t>+</m:t>
+                                  </m:r>
+                                </m:sup>
+                              </m:sSup>
+                              <m:r>
+                                <a:rPr lang="it-IT" b="1" i="1" smtClean="0">
+                                  <a:solidFill>
+                                    <a:schemeClr val="tx2"/>
+                                  </a:solidFill>
+                                  <a:latin typeface="Cambria Math" panose="02040503050406030204" pitchFamily="18" charset="0"/>
+                                  <a:cs typeface="Arial" panose="020B0604020202020204" pitchFamily="34" charset="0"/>
+                                </a:rPr>
+                                <m:t>=</m:t>
+                              </m:r>
+                              <m:sSub>
+                                <m:sSubPr>
+                                  <m:ctrlPr>
+                                    <a:rPr lang="it-IT" b="1" i="1" smtClean="0">
+                                      <a:solidFill>
+                                        <a:schemeClr val="tx2"/>
+                                      </a:solidFill>
+                                      <a:latin typeface="Cambria Math" panose="02040503050406030204" pitchFamily="18" charset="0"/>
+                                      <a:cs typeface="Arial" panose="020B0604020202020204" pitchFamily="34" charset="0"/>
+                                    </a:rPr>
+                                  </m:ctrlPr>
+                                </m:sSubPr>
+                                <m:e>
+                                  <m:r>
+                                    <a:rPr lang="it-IT" b="1" i="1" smtClean="0">
+                                      <a:solidFill>
+                                        <a:schemeClr val="tx2"/>
+                                      </a:solidFill>
+                                      <a:latin typeface="Cambria Math" panose="02040503050406030204" pitchFamily="18" charset="0"/>
+                                      <a:cs typeface="Arial" panose="020B0604020202020204" pitchFamily="34" charset="0"/>
+                                    </a:rPr>
+                                    <m:t>𝑨</m:t>
+                                  </m:r>
+                                </m:e>
+                                <m:sub>
+                                  <m:r>
+                                    <a:rPr lang="it-IT" b="1" i="1" smtClean="0">
+                                      <a:solidFill>
+                                        <a:schemeClr val="tx2"/>
+                                      </a:solidFill>
+                                      <a:latin typeface="Cambria Math" panose="02040503050406030204" pitchFamily="18" charset="0"/>
+                                      <a:cs typeface="Arial" panose="020B0604020202020204" pitchFamily="34" charset="0"/>
+                                    </a:rPr>
+                                    <m:t>𝟐</m:t>
+                                  </m:r>
+                                </m:sub>
+                              </m:sSub>
+                            </m:e>
+                            <m:e>
+                              <m:r>
+                                <a:rPr lang="it-IT" b="1" i="1" smtClean="0">
+                                  <a:solidFill>
+                                    <a:schemeClr val="tx2"/>
+                                  </a:solidFill>
+                                  <a:latin typeface="Cambria Math" panose="02040503050406030204" pitchFamily="18" charset="0"/>
+                                </a:rPr>
+                                <m:t>−</m:t>
+                              </m:r>
+                              <m:sSup>
+                                <m:sSupPr>
+                                  <m:ctrlPr>
+                                    <a:rPr lang="it-IT" b="1" i="1" smtClean="0">
+                                      <a:solidFill>
+                                        <a:schemeClr val="tx2"/>
+                                      </a:solidFill>
+                                      <a:latin typeface="Cambria Math" panose="02040503050406030204" pitchFamily="18" charset="0"/>
+                                    </a:rPr>
+                                  </m:ctrlPr>
+                                </m:sSupPr>
+                                <m:e>
+                                  <m:d>
+                                    <m:dPr>
+                                      <m:begChr m:val="⟨"/>
+                                      <m:endChr m:val="⟩"/>
+                                      <m:ctrlPr>
+                                        <a:rPr lang="it-IT" b="1" i="1" smtClean="0">
+                                          <a:solidFill>
+                                            <a:schemeClr val="tx2"/>
+                                          </a:solidFill>
+                                          <a:latin typeface="Cambria Math" panose="02040503050406030204" pitchFamily="18" charset="0"/>
+                                        </a:rPr>
+                                      </m:ctrlPr>
+                                    </m:dPr>
+                                    <m:e>
+                                      <m:sSup>
+                                        <m:sSupPr>
+                                          <m:ctrlPr>
+                                            <a:rPr lang="it-IT" b="1" i="1" smtClean="0">
+                                              <a:solidFill>
+                                                <a:schemeClr val="tx2"/>
+                                              </a:solidFill>
+                                              <a:latin typeface="Cambria Math" panose="02040503050406030204" pitchFamily="18" charset="0"/>
+                                            </a:rPr>
+                                          </m:ctrlPr>
+                                        </m:sSupPr>
+                                        <m:e>
+                                          <m:r>
+                                            <a:rPr lang="it-IT" b="1" i="1" smtClean="0">
+                                              <a:solidFill>
+                                                <a:schemeClr val="tx2"/>
+                                              </a:solidFill>
+                                              <a:latin typeface="Cambria Math" panose="02040503050406030204" pitchFamily="18" charset="0"/>
+                                            </a:rPr>
+                                            <m:t>𝒖</m:t>
+                                          </m:r>
+                                        </m:e>
+                                        <m:sup>
+                                          <m:r>
+                                            <a:rPr lang="it-IT" b="1" i="1" smtClean="0">
+                                              <a:solidFill>
+                                                <a:schemeClr val="tx2"/>
+                                              </a:solidFill>
+                                              <a:latin typeface="Cambria Math" panose="02040503050406030204" pitchFamily="18" charset="0"/>
+                                            </a:rPr>
+                                            <m:t>′</m:t>
+                                          </m:r>
+                                        </m:sup>
+                                      </m:sSup>
+                                      <m:sSup>
+                                        <m:sSupPr>
+                                          <m:ctrlPr>
+                                            <a:rPr lang="it-IT" b="1" i="1" smtClean="0">
+                                              <a:solidFill>
+                                                <a:schemeClr val="tx2"/>
+                                              </a:solidFill>
+                                              <a:latin typeface="Cambria Math" panose="02040503050406030204" pitchFamily="18" charset="0"/>
+                                            </a:rPr>
+                                          </m:ctrlPr>
+                                        </m:sSupPr>
+                                        <m:e>
+                                          <m:r>
+                                            <a:rPr lang="it-IT" b="1" i="1" smtClean="0">
+                                              <a:solidFill>
+                                                <a:schemeClr val="tx2"/>
+                                              </a:solidFill>
+                                              <a:latin typeface="Cambria Math" panose="02040503050406030204" pitchFamily="18" charset="0"/>
+                                            </a:rPr>
+                                            <m:t>𝒗</m:t>
+                                          </m:r>
+                                        </m:e>
+                                        <m:sup>
+                                          <m:r>
+                                            <a:rPr lang="it-IT" b="1" i="1" smtClean="0">
+                                              <a:solidFill>
+                                                <a:schemeClr val="tx2"/>
+                                              </a:solidFill>
+                                              <a:latin typeface="Cambria Math" panose="02040503050406030204" pitchFamily="18" charset="0"/>
+                                            </a:rPr>
+                                            <m:t>′</m:t>
+                                          </m:r>
+                                        </m:sup>
+                                      </m:sSup>
+                                    </m:e>
+                                  </m:d>
+                                </m:e>
+                                <m:sup>
+                                  <m:r>
+                                    <a:rPr lang="it-IT" b="1" i="1" smtClean="0">
+                                      <a:solidFill>
+                                        <a:schemeClr val="tx2"/>
+                                      </a:solidFill>
+                                      <a:latin typeface="Cambria Math" panose="02040503050406030204" pitchFamily="18" charset="0"/>
+                                    </a:rPr>
+                                    <m:t>+</m:t>
+                                  </m:r>
+                                </m:sup>
+                              </m:sSup>
+                              <m:r>
+                                <a:rPr lang="it-IT" b="1" i="1" smtClean="0">
+                                  <a:solidFill>
+                                    <a:schemeClr val="tx2"/>
+                                  </a:solidFill>
+                                  <a:latin typeface="Cambria Math" panose="02040503050406030204" pitchFamily="18" charset="0"/>
+                                </a:rPr>
+                                <m:t>=</m:t>
+                              </m:r>
+                              <m:r>
+                                <a:rPr lang="it-IT" b="1" i="1" smtClean="0">
+                                  <a:solidFill>
+                                    <a:schemeClr val="tx2"/>
+                                  </a:solidFill>
+                                  <a:latin typeface="Cambria Math" panose="02040503050406030204" pitchFamily="18" charset="0"/>
+                                  <a:ea typeface="Cambria Math" panose="02040503050406030204" pitchFamily="18" charset="0"/>
+                                </a:rPr>
+                                <m:t>𝟏</m:t>
+                              </m:r>
+                            </m:e>
+                            <m:e>
+                              <m:sSup>
+                                <m:sSupPr>
+                                  <m:ctrlPr>
+                                    <a:rPr lang="it-IT" b="1" i="1" smtClean="0">
+                                      <a:solidFill>
+                                        <a:schemeClr val="tx2"/>
+                                      </a:solidFill>
+                                      <a:latin typeface="Cambria Math" panose="02040503050406030204" pitchFamily="18" charset="0"/>
+                                    </a:rPr>
+                                  </m:ctrlPr>
+                                </m:sSupPr>
+                                <m:e>
+                                  <m:d>
+                                    <m:dPr>
+                                      <m:begChr m:val="⟨"/>
+                                      <m:endChr m:val="⟩"/>
+                                      <m:ctrlPr>
+                                        <a:rPr lang="it-IT" b="1" i="1" smtClean="0">
+                                          <a:solidFill>
+                                            <a:schemeClr val="tx2"/>
+                                          </a:solidFill>
+                                          <a:latin typeface="Cambria Math" panose="02040503050406030204" pitchFamily="18" charset="0"/>
+                                        </a:rPr>
+                                      </m:ctrlPr>
+                                    </m:dPr>
+                                    <m:e>
+                                      <m:sSup>
+                                        <m:sSupPr>
+                                          <m:ctrlPr>
+                                            <a:rPr lang="it-IT" b="1" i="1" smtClean="0">
+                                              <a:solidFill>
+                                                <a:schemeClr val="tx2"/>
+                                              </a:solidFill>
+                                              <a:latin typeface="Cambria Math" panose="02040503050406030204" pitchFamily="18" charset="0"/>
+                                            </a:rPr>
+                                          </m:ctrlPr>
+                                        </m:sSupPr>
+                                        <m:e>
+                                          <m:r>
+                                            <a:rPr lang="it-IT" b="1" i="1" smtClean="0">
+                                              <a:solidFill>
+                                                <a:schemeClr val="tx2"/>
+                                              </a:solidFill>
+                                              <a:latin typeface="Cambria Math" panose="02040503050406030204" pitchFamily="18" charset="0"/>
+                                            </a:rPr>
+                                            <m:t>𝒖</m:t>
+                                          </m:r>
+                                        </m:e>
+                                        <m:sup>
+                                          <m:r>
+                                            <a:rPr lang="it-IT" b="1" i="1" smtClean="0">
+                                              <a:solidFill>
+                                                <a:schemeClr val="tx2"/>
+                                              </a:solidFill>
+                                              <a:latin typeface="Cambria Math" panose="02040503050406030204" pitchFamily="18" charset="0"/>
+                                            </a:rPr>
+                                            <m:t>′</m:t>
+                                          </m:r>
+                                        </m:sup>
+                                      </m:sSup>
+                                      <m:r>
+                                        <a:rPr lang="it-IT" b="1" i="1" smtClean="0">
+                                          <a:solidFill>
+                                            <a:schemeClr val="tx2"/>
+                                          </a:solidFill>
+                                          <a:latin typeface="Cambria Math" panose="02040503050406030204" pitchFamily="18" charset="0"/>
+                                        </a:rPr>
+                                        <m:t>𝒖</m:t>
+                                      </m:r>
+                                      <m:r>
+                                        <a:rPr lang="it-IT" b="1" i="1" smtClean="0">
+                                          <a:solidFill>
+                                            <a:schemeClr val="tx2"/>
+                                          </a:solidFill>
+                                          <a:latin typeface="Cambria Math" panose="02040503050406030204" pitchFamily="18" charset="0"/>
+                                        </a:rPr>
+                                        <m:t>′</m:t>
+                                      </m:r>
+                                    </m:e>
+                                  </m:d>
+                                </m:e>
+                                <m:sup>
+                                  <m:r>
+                                    <a:rPr lang="it-IT" b="1" i="1" smtClean="0">
+                                      <a:solidFill>
+                                        <a:schemeClr val="tx2"/>
+                                      </a:solidFill>
+                                      <a:latin typeface="Cambria Math" panose="02040503050406030204" pitchFamily="18" charset="0"/>
+                                    </a:rPr>
+                                    <m:t>+</m:t>
+                                  </m:r>
+                                </m:sup>
+                              </m:sSup>
+                              <m:r>
+                                <a:rPr lang="it-IT" b="1" i="1" smtClean="0">
+                                  <a:solidFill>
+                                    <a:schemeClr val="tx2"/>
+                                  </a:solidFill>
+                                  <a:latin typeface="Cambria Math" panose="02040503050406030204" pitchFamily="18" charset="0"/>
+                                </a:rPr>
+                                <m:t>=</m:t>
+                              </m:r>
+                              <m:sSub>
+                                <m:sSubPr>
+                                  <m:ctrlPr>
+                                    <a:rPr lang="it-IT" b="1" i="1" smtClean="0">
+                                      <a:solidFill>
+                                        <a:schemeClr val="tx2"/>
+                                      </a:solidFill>
+                                      <a:latin typeface="Cambria Math" panose="02040503050406030204" pitchFamily="18" charset="0"/>
+                                    </a:rPr>
+                                  </m:ctrlPr>
+                                </m:sSubPr>
+                                <m:e>
+                                  <m:r>
+                                    <a:rPr lang="it-IT" b="1" i="1" smtClean="0">
+                                      <a:solidFill>
+                                        <a:schemeClr val="tx2"/>
+                                      </a:solidFill>
+                                      <a:latin typeface="Cambria Math" panose="02040503050406030204" pitchFamily="18" charset="0"/>
+                                    </a:rPr>
+                                    <m:t>𝑨</m:t>
+                                  </m:r>
+                                </m:e>
+                                <m:sub>
+                                  <m:r>
+                                    <a:rPr lang="it-IT" b="1" i="1" smtClean="0">
+                                      <a:solidFill>
+                                        <a:schemeClr val="tx2"/>
+                                      </a:solidFill>
+                                      <a:latin typeface="Cambria Math" panose="02040503050406030204" pitchFamily="18" charset="0"/>
+                                    </a:rPr>
+                                    <m:t>𝟏</m:t>
+                                  </m:r>
+                                </m:sub>
+                              </m:sSub>
+                              <m:r>
+                                <a:rPr lang="it-IT" b="1" i="1" smtClean="0">
+                                  <a:solidFill>
+                                    <a:schemeClr val="tx2"/>
+                                  </a:solidFill>
+                                  <a:latin typeface="Cambria Math" panose="02040503050406030204" pitchFamily="18" charset="0"/>
+                                </a:rPr>
+                                <m:t>−</m:t>
+                              </m:r>
+                              <m:sSub>
+                                <m:sSubPr>
+                                  <m:ctrlPr>
+                                    <a:rPr lang="it-IT" b="1" i="1" smtClean="0">
+                                      <a:solidFill>
+                                        <a:schemeClr val="tx2"/>
+                                      </a:solidFill>
+                                      <a:latin typeface="Cambria Math" panose="02040503050406030204" pitchFamily="18" charset="0"/>
+                                    </a:rPr>
+                                  </m:ctrlPr>
+                                </m:sSubPr>
+                                <m:e>
+                                  <m:r>
+                                    <a:rPr lang="it-IT" b="1" i="1" smtClean="0">
+                                      <a:solidFill>
+                                        <a:schemeClr val="tx2"/>
+                                      </a:solidFill>
+                                      <a:latin typeface="Cambria Math" panose="02040503050406030204" pitchFamily="18" charset="0"/>
+                                    </a:rPr>
+                                    <m:t>𝑩</m:t>
+                                  </m:r>
+                                </m:e>
+                                <m:sub>
+                                  <m:r>
+                                    <a:rPr lang="it-IT" b="1" i="1" smtClean="0">
+                                      <a:solidFill>
+                                        <a:schemeClr val="tx2"/>
+                                      </a:solidFill>
+                                      <a:latin typeface="Cambria Math" panose="02040503050406030204" pitchFamily="18" charset="0"/>
+                                    </a:rPr>
+                                    <m:t>𝟏</m:t>
+                                  </m:r>
+                                </m:sub>
+                              </m:sSub>
+                              <m:r>
+                                <a:rPr lang="it-IT" b="1" i="0" smtClean="0">
+                                  <a:solidFill>
+                                    <a:schemeClr val="tx2"/>
+                                  </a:solidFill>
+                                  <a:latin typeface="Cambria Math" panose="02040503050406030204" pitchFamily="18" charset="0"/>
+                                </a:rPr>
+                                <m:t>𝐥𝐨𝐠</m:t>
+                              </m:r>
+                              <m:r>
+                                <a:rPr lang="it-IT" b="1" i="1" smtClean="0">
+                                  <a:solidFill>
+                                    <a:schemeClr val="tx2"/>
+                                  </a:solidFill>
+                                  <a:latin typeface="Cambria Math" panose="02040503050406030204" pitchFamily="18" charset="0"/>
+                                </a:rPr>
+                                <m:t>⁡(</m:t>
+                              </m:r>
+                              <m:sSup>
+                                <m:sSupPr>
+                                  <m:ctrlPr>
+                                    <a:rPr lang="it-IT" b="1" i="1" smtClean="0">
+                                      <a:solidFill>
+                                        <a:schemeClr val="tx2"/>
+                                      </a:solidFill>
+                                      <a:latin typeface="Cambria Math" panose="02040503050406030204" pitchFamily="18" charset="0"/>
+                                    </a:rPr>
+                                  </m:ctrlPr>
+                                </m:sSupPr>
+                                <m:e>
+                                  <m:r>
+                                    <a:rPr lang="it-IT" b="1" i="1" smtClean="0">
+                                      <a:solidFill>
+                                        <a:schemeClr val="tx2"/>
+                                      </a:solidFill>
+                                      <a:latin typeface="Cambria Math" panose="02040503050406030204" pitchFamily="18" charset="0"/>
+                                    </a:rPr>
+                                    <m:t>𝒚</m:t>
+                                  </m:r>
+                                </m:e>
+                                <m:sup>
+                                  <m:r>
+                                    <a:rPr lang="it-IT" b="1" i="1" smtClean="0">
+                                      <a:solidFill>
+                                        <a:schemeClr val="tx2"/>
+                                      </a:solidFill>
+                                      <a:latin typeface="Cambria Math" panose="02040503050406030204" pitchFamily="18" charset="0"/>
+                                    </a:rPr>
+                                    <m:t>+</m:t>
+                                  </m:r>
+                                </m:sup>
+                              </m:sSup>
+                              <m:r>
+                                <a:rPr lang="it-IT" b="1" i="1" smtClean="0">
+                                  <a:solidFill>
+                                    <a:schemeClr val="tx2"/>
+                                  </a:solidFill>
+                                  <a:latin typeface="Cambria Math" panose="02040503050406030204" pitchFamily="18" charset="0"/>
+                                </a:rPr>
+                                <m:t>)</m:t>
+                              </m:r>
+                            </m:e>
+                            <m:e>
+                              <m:sSup>
+                                <m:sSupPr>
+                                  <m:ctrlPr>
+                                    <a:rPr lang="it-IT" b="1" i="1" smtClean="0">
+                                      <a:solidFill>
+                                        <a:schemeClr val="tx2"/>
+                                      </a:solidFill>
+                                      <a:latin typeface="Cambria Math" panose="02040503050406030204" pitchFamily="18" charset="0"/>
+                                    </a:rPr>
+                                  </m:ctrlPr>
+                                </m:sSupPr>
+                                <m:e>
+                                  <m:d>
+                                    <m:dPr>
+                                      <m:begChr m:val="⟨"/>
+                                      <m:endChr m:val="⟩"/>
+                                      <m:ctrlPr>
+                                        <a:rPr lang="it-IT" b="1" i="1" smtClean="0">
+                                          <a:solidFill>
+                                            <a:schemeClr val="tx2"/>
+                                          </a:solidFill>
+                                          <a:latin typeface="Cambria Math" panose="02040503050406030204" pitchFamily="18" charset="0"/>
+                                        </a:rPr>
+                                      </m:ctrlPr>
+                                    </m:dPr>
+                                    <m:e>
+                                      <m:sSup>
+                                        <m:sSupPr>
+                                          <m:ctrlPr>
+                                            <a:rPr lang="it-IT" b="1" i="1" smtClean="0">
+                                              <a:solidFill>
+                                                <a:schemeClr val="tx2"/>
+                                              </a:solidFill>
+                                              <a:latin typeface="Cambria Math" panose="02040503050406030204" pitchFamily="18" charset="0"/>
+                                            </a:rPr>
+                                          </m:ctrlPr>
+                                        </m:sSupPr>
+                                        <m:e>
+                                          <m:r>
+                                            <a:rPr lang="it-IT" b="1" i="1" smtClean="0">
+                                              <a:solidFill>
+                                                <a:schemeClr val="tx2"/>
+                                              </a:solidFill>
+                                              <a:latin typeface="Cambria Math" panose="02040503050406030204" pitchFamily="18" charset="0"/>
+                                            </a:rPr>
+                                            <m:t>𝒘</m:t>
+                                          </m:r>
+                                        </m:e>
+                                        <m:sup>
+                                          <m:r>
+                                            <a:rPr lang="it-IT" b="1" i="1" smtClean="0">
+                                              <a:solidFill>
+                                                <a:schemeClr val="tx2"/>
+                                              </a:solidFill>
+                                              <a:latin typeface="Cambria Math" panose="02040503050406030204" pitchFamily="18" charset="0"/>
+                                            </a:rPr>
+                                            <m:t>′</m:t>
+                                          </m:r>
+                                        </m:sup>
+                                      </m:sSup>
+                                      <m:r>
+                                        <a:rPr lang="it-IT" b="1" i="1" smtClean="0">
+                                          <a:solidFill>
+                                            <a:schemeClr val="tx2"/>
+                                          </a:solidFill>
+                                          <a:latin typeface="Cambria Math" panose="02040503050406030204" pitchFamily="18" charset="0"/>
+                                        </a:rPr>
+                                        <m:t>𝒘</m:t>
+                                      </m:r>
+                                      <m:r>
+                                        <a:rPr lang="it-IT" b="1" i="1" smtClean="0">
+                                          <a:solidFill>
+                                            <a:schemeClr val="tx2"/>
+                                          </a:solidFill>
+                                          <a:latin typeface="Cambria Math" panose="02040503050406030204" pitchFamily="18" charset="0"/>
+                                        </a:rPr>
+                                        <m:t>′</m:t>
+                                      </m:r>
+                                    </m:e>
+                                  </m:d>
+                                </m:e>
+                                <m:sup>
+                                  <m:r>
+                                    <a:rPr lang="it-IT" b="1" i="1" smtClean="0">
+                                      <a:solidFill>
+                                        <a:schemeClr val="tx2"/>
+                                      </a:solidFill>
+                                      <a:latin typeface="Cambria Math" panose="02040503050406030204" pitchFamily="18" charset="0"/>
+                                    </a:rPr>
+                                    <m:t>+</m:t>
+                                  </m:r>
+                                </m:sup>
+                              </m:sSup>
+                              <m:r>
+                                <a:rPr lang="it-IT" b="1" i="1" smtClean="0">
+                                  <a:solidFill>
+                                    <a:schemeClr val="tx2"/>
+                                  </a:solidFill>
+                                  <a:latin typeface="Cambria Math" panose="02040503050406030204" pitchFamily="18" charset="0"/>
+                                </a:rPr>
+                                <m:t>=</m:t>
+                              </m:r>
+                              <m:sSub>
+                                <m:sSubPr>
+                                  <m:ctrlPr>
+                                    <a:rPr lang="it-IT" b="1" i="1" smtClean="0">
+                                      <a:solidFill>
+                                        <a:schemeClr val="tx2"/>
+                                      </a:solidFill>
+                                      <a:latin typeface="Cambria Math" panose="02040503050406030204" pitchFamily="18" charset="0"/>
+                                    </a:rPr>
+                                  </m:ctrlPr>
+                                </m:sSubPr>
+                                <m:e>
+                                  <m:r>
+                                    <a:rPr lang="it-IT" b="1" i="1" smtClean="0">
+                                      <a:solidFill>
+                                        <a:schemeClr val="tx2"/>
+                                      </a:solidFill>
+                                      <a:latin typeface="Cambria Math" panose="02040503050406030204" pitchFamily="18" charset="0"/>
+                                    </a:rPr>
+                                    <m:t>𝑨</m:t>
+                                  </m:r>
+                                </m:e>
+                                <m:sub>
+                                  <m:r>
+                                    <a:rPr lang="it-IT" b="1" i="1" smtClean="0">
+                                      <a:solidFill>
+                                        <a:schemeClr val="tx2"/>
+                                      </a:solidFill>
+                                      <a:latin typeface="Cambria Math" panose="02040503050406030204" pitchFamily="18" charset="0"/>
+                                    </a:rPr>
+                                    <m:t>𝟑</m:t>
+                                  </m:r>
+                                </m:sub>
+                              </m:sSub>
+                              <m:r>
+                                <a:rPr lang="it-IT" b="1" i="1" smtClean="0">
+                                  <a:solidFill>
+                                    <a:schemeClr val="tx2"/>
+                                  </a:solidFill>
+                                  <a:latin typeface="Cambria Math" panose="02040503050406030204" pitchFamily="18" charset="0"/>
+                                </a:rPr>
+                                <m:t>−</m:t>
+                              </m:r>
+                              <m:sSub>
+                                <m:sSubPr>
+                                  <m:ctrlPr>
+                                    <a:rPr lang="it-IT" b="1" i="1" smtClean="0">
+                                      <a:solidFill>
+                                        <a:schemeClr val="tx2"/>
+                                      </a:solidFill>
+                                      <a:latin typeface="Cambria Math" panose="02040503050406030204" pitchFamily="18" charset="0"/>
+                                    </a:rPr>
+                                  </m:ctrlPr>
+                                </m:sSubPr>
+                                <m:e>
+                                  <m:r>
+                                    <a:rPr lang="it-IT" b="1" i="1" smtClean="0">
+                                      <a:solidFill>
+                                        <a:schemeClr val="tx2"/>
+                                      </a:solidFill>
+                                      <a:latin typeface="Cambria Math" panose="02040503050406030204" pitchFamily="18" charset="0"/>
+                                    </a:rPr>
+                                    <m:t>𝑩</m:t>
+                                  </m:r>
+                                </m:e>
+                                <m:sub>
+                                  <m:r>
+                                    <a:rPr lang="it-IT" b="1" i="1" smtClean="0">
+                                      <a:solidFill>
+                                        <a:schemeClr val="tx2"/>
+                                      </a:solidFill>
+                                      <a:latin typeface="Cambria Math" panose="02040503050406030204" pitchFamily="18" charset="0"/>
+                                    </a:rPr>
+                                    <m:t>𝟑</m:t>
+                                  </m:r>
+                                </m:sub>
+                              </m:sSub>
+                              <m:r>
+                                <a:rPr lang="it-IT" b="1" i="0" smtClean="0">
+                                  <a:solidFill>
+                                    <a:schemeClr val="tx2"/>
+                                  </a:solidFill>
+                                  <a:latin typeface="Cambria Math" panose="02040503050406030204" pitchFamily="18" charset="0"/>
+                                </a:rPr>
+                                <m:t>𝐥𝐨𝐠</m:t>
+                              </m:r>
+                              <m:r>
+                                <a:rPr lang="it-IT" b="1" i="1" smtClean="0">
+                                  <a:solidFill>
+                                    <a:schemeClr val="tx2"/>
+                                  </a:solidFill>
+                                  <a:latin typeface="Cambria Math" panose="02040503050406030204" pitchFamily="18" charset="0"/>
+                                </a:rPr>
+                                <m:t>⁡(</m:t>
+                              </m:r>
+                              <m:sSup>
+                                <m:sSupPr>
+                                  <m:ctrlPr>
+                                    <a:rPr lang="it-IT" b="1" i="1" smtClean="0">
+                                      <a:solidFill>
+                                        <a:schemeClr val="tx2"/>
+                                      </a:solidFill>
+                                      <a:latin typeface="Cambria Math" panose="02040503050406030204" pitchFamily="18" charset="0"/>
+                                    </a:rPr>
+                                  </m:ctrlPr>
+                                </m:sSupPr>
+                                <m:e>
+                                  <m:r>
+                                    <a:rPr lang="it-IT" b="1" i="1" smtClean="0">
+                                      <a:solidFill>
+                                        <a:schemeClr val="tx2"/>
+                                      </a:solidFill>
+                                      <a:latin typeface="Cambria Math" panose="02040503050406030204" pitchFamily="18" charset="0"/>
+                                    </a:rPr>
+                                    <m:t>𝒚</m:t>
+                                  </m:r>
+                                </m:e>
+                                <m:sup>
+                                  <m:r>
+                                    <a:rPr lang="it-IT" b="1" i="1" smtClean="0">
+                                      <a:solidFill>
+                                        <a:schemeClr val="tx2"/>
+                                      </a:solidFill>
+                                      <a:latin typeface="Cambria Math" panose="02040503050406030204" pitchFamily="18" charset="0"/>
+                                    </a:rPr>
+                                    <m:t>+</m:t>
+                                  </m:r>
+                                </m:sup>
+                              </m:sSup>
+                              <m:r>
+                                <a:rPr lang="it-IT" b="1" i="1" smtClean="0">
+                                  <a:solidFill>
+                                    <a:schemeClr val="tx2"/>
+                                  </a:solidFill>
+                                  <a:latin typeface="Cambria Math" panose="02040503050406030204" pitchFamily="18" charset="0"/>
+                                </a:rPr>
+                                <m:t>)</m:t>
+                              </m:r>
+                            </m:e>
+                          </m:eqArr>
+                        </m:e>
+                      </m:d>
+                    </m:oMath>
+                  </m:oMathPara>
+                </a14:m>
+                <a:endParaRPr lang="it-IT" b="1" dirty="0">
+                  <a:solidFill>
+                    <a:schemeClr val="tx2"/>
+                  </a:solidFill>
+                  <a:latin typeface="Arial" panose="020B0604020202020204" pitchFamily="34" charset="0"/>
+                  <a:cs typeface="Arial" panose="020B0604020202020204" pitchFamily="34" charset="0"/>
+                </a:endParaRPr>
+              </a:p>
+            </p:txBody>
+          </p:sp>
+        </mc:Choice>
+        <mc:Fallback>
+          <p:sp>
+            <p:nvSpPr>
+              <p:cNvPr id="4" name="CasellaDiTesto 3">
+                <a:extLst>
+                  <a:ext uri="{FF2B5EF4-FFF2-40B4-BE49-F238E27FC236}">
+                    <a16:creationId xmlns:a16="http://schemas.microsoft.com/office/drawing/2014/main" id="{DA72DDD2-BD2B-C54B-BE2E-3E052477072F}"/>
+                  </a:ext>
+                </a:extLst>
+              </p:cNvPr>
+              <p:cNvSpPr txBox="1">
+                <a:spLocks noRot="1" noChangeAspect="1" noMove="1" noResize="1" noEditPoints="1" noAdjustHandles="1" noChangeArrowheads="1" noChangeShapeType="1" noTextEdit="1"/>
+              </p:cNvSpPr>
+              <p:nvPr/>
+            </p:nvSpPr>
+            <p:spPr>
+              <a:xfrm>
+                <a:off x="5119780" y="4409954"/>
+                <a:ext cx="3106748" cy="1360309"/>
+              </a:xfrm>
+              <a:prstGeom prst="rect">
+                <a:avLst/>
+              </a:prstGeom>
+              <a:blipFill>
+                <a:blip r:embed="rId4"/>
+                <a:stretch>
+                  <a:fillRect b="-926"/>
+                </a:stretch>
+              </a:blipFill>
+            </p:spPr>
+            <p:txBody>
+              <a:bodyPr/>
+              <a:lstStyle/>
+              <a:p>
+                <a:r>
+                  <a:rPr lang="it-IT">
+                    <a:noFill/>
+                  </a:rPr>
+                  <a:t> </a:t>
+                </a:r>
+              </a:p>
+            </p:txBody>
+          </p:sp>
+        </mc:Fallback>
+      </mc:AlternateContent>
     </p:spTree>
     <p:extLst>
       <p:ext uri="{BB962C8B-B14F-4D97-AF65-F5344CB8AC3E}">
-        <p14:creationId xmlns:p14="http://schemas.microsoft.com/office/powerpoint/2010/main" val="2623125661"/>
+        <p14:creationId xmlns:p14="http://schemas.microsoft.com/office/powerpoint/2010/main" val="1001874613"/>
       </p:ext>
     </p:extLst>
   </p:cSld>
@@ -24087,6 +25491,204 @@
       </p:transition>
     </mc:Fallback>
   </mc:AlternateContent>
+  <p:timing>
+    <p:tnLst>
+      <p:par>
+        <p:cTn id="1" dur="indefinite" restart="never" nodeType="tmRoot">
+          <p:childTnLst>
+            <p:seq concurrent="1" nextAc="seek">
+              <p:cTn id="2" dur="indefinite" nodeType="mainSeq">
+                <p:childTnLst>
+                  <p:par>
+                    <p:cTn id="3" fill="hold">
+                      <p:stCondLst>
+                        <p:cond delay="indefinite"/>
+                      </p:stCondLst>
+                      <p:childTnLst>
+                        <p:par>
+                          <p:cTn id="4" fill="hold">
+                            <p:stCondLst>
+                              <p:cond delay="0"/>
+                            </p:stCondLst>
+                            <p:childTnLst>
+                              <p:par>
+                                <p:cTn id="5" presetID="2" presetClass="entr" presetSubtype="4" fill="hold" grpId="0" nodeType="clickEffect">
+                                  <p:stCondLst>
+                                    <p:cond delay="0"/>
+                                  </p:stCondLst>
+                                  <p:childTnLst>
+                                    <p:set>
+                                      <p:cBhvr>
+                                        <p:cTn id="6" dur="1" fill="hold">
+                                          <p:stCondLst>
+                                            <p:cond delay="0"/>
+                                          </p:stCondLst>
+                                        </p:cTn>
+                                        <p:tgtEl>
+                                          <p:spTgt spid="12"/>
+                                        </p:tgtEl>
+                                        <p:attrNameLst>
+                                          <p:attrName>style.visibility</p:attrName>
+                                        </p:attrNameLst>
+                                      </p:cBhvr>
+                                      <p:to>
+                                        <p:strVal val="visible"/>
+                                      </p:to>
+                                    </p:set>
+                                    <p:anim calcmode="lin" valueType="num">
+                                      <p:cBhvr additive="base">
+                                        <p:cTn id="7" dur="500" fill="hold"/>
+                                        <p:tgtEl>
+                                          <p:spTgt spid="12"/>
+                                        </p:tgtEl>
+                                        <p:attrNameLst>
+                                          <p:attrName>ppt_x</p:attrName>
+                                        </p:attrNameLst>
+                                      </p:cBhvr>
+                                      <p:tavLst>
+                                        <p:tav tm="0">
+                                          <p:val>
+                                            <p:strVal val="#ppt_x"/>
+                                          </p:val>
+                                        </p:tav>
+                                        <p:tav tm="100000">
+                                          <p:val>
+                                            <p:strVal val="#ppt_x"/>
+                                          </p:val>
+                                        </p:tav>
+                                      </p:tavLst>
+                                    </p:anim>
+                                    <p:anim calcmode="lin" valueType="num">
+                                      <p:cBhvr additive="base">
+                                        <p:cTn id="8" dur="500" fill="hold"/>
+                                        <p:tgtEl>
+                                          <p:spTgt spid="12"/>
+                                        </p:tgtEl>
+                                        <p:attrNameLst>
+                                          <p:attrName>ppt_y</p:attrName>
+                                        </p:attrNameLst>
+                                      </p:cBhvr>
+                                      <p:tavLst>
+                                        <p:tav tm="0">
+                                          <p:val>
+                                            <p:strVal val="1+#ppt_h/2"/>
+                                          </p:val>
+                                        </p:tav>
+                                        <p:tav tm="100000">
+                                          <p:val>
+                                            <p:strVal val="#ppt_y"/>
+                                          </p:val>
+                                        </p:tav>
+                                      </p:tavLst>
+                                    </p:anim>
+                                  </p:childTnLst>
+                                </p:cTn>
+                              </p:par>
+                              <p:par>
+                                <p:cTn id="9" presetID="2" presetClass="entr" presetSubtype="4" fill="hold" grpId="0" nodeType="withEffect">
+                                  <p:stCondLst>
+                                    <p:cond delay="0"/>
+                                  </p:stCondLst>
+                                  <p:childTnLst>
+                                    <p:set>
+                                      <p:cBhvr>
+                                        <p:cTn id="10" dur="1" fill="hold">
+                                          <p:stCondLst>
+                                            <p:cond delay="0"/>
+                                          </p:stCondLst>
+                                        </p:cTn>
+                                        <p:tgtEl>
+                                          <p:spTgt spid="2"/>
+                                        </p:tgtEl>
+                                        <p:attrNameLst>
+                                          <p:attrName>style.visibility</p:attrName>
+                                        </p:attrNameLst>
+                                      </p:cBhvr>
+                                      <p:to>
+                                        <p:strVal val="visible"/>
+                                      </p:to>
+                                    </p:set>
+                                    <p:anim calcmode="lin" valueType="num">
+                                      <p:cBhvr additive="base">
+                                        <p:cTn id="11" dur="500" fill="hold"/>
+                                        <p:tgtEl>
+                                          <p:spTgt spid="2"/>
+                                        </p:tgtEl>
+                                        <p:attrNameLst>
+                                          <p:attrName>ppt_x</p:attrName>
+                                        </p:attrNameLst>
+                                      </p:cBhvr>
+                                      <p:tavLst>
+                                        <p:tav tm="0">
+                                          <p:val>
+                                            <p:strVal val="#ppt_x"/>
+                                          </p:val>
+                                        </p:tav>
+                                        <p:tav tm="100000">
+                                          <p:val>
+                                            <p:strVal val="#ppt_x"/>
+                                          </p:val>
+                                        </p:tav>
+                                      </p:tavLst>
+                                    </p:anim>
+                                    <p:anim calcmode="lin" valueType="num">
+                                      <p:cBhvr additive="base">
+                                        <p:cTn id="12" dur="500" fill="hold"/>
+                                        <p:tgtEl>
+                                          <p:spTgt spid="2"/>
+                                        </p:tgtEl>
+                                        <p:attrNameLst>
+                                          <p:attrName>ppt_y</p:attrName>
+                                        </p:attrNameLst>
+                                      </p:cBhvr>
+                                      <p:tavLst>
+                                        <p:tav tm="0">
+                                          <p:val>
+                                            <p:strVal val="1+#ppt_h/2"/>
+                                          </p:val>
+                                        </p:tav>
+                                        <p:tav tm="100000">
+                                          <p:val>
+                                            <p:strVal val="#ppt_y"/>
+                                          </p:val>
+                                        </p:tav>
+                                      </p:tavLst>
+                                    </p:anim>
+                                  </p:childTnLst>
+                                </p:cTn>
+                              </p:par>
+                            </p:childTnLst>
+                          </p:cTn>
+                        </p:par>
+                      </p:childTnLst>
+                    </p:cTn>
+                  </p:par>
+                </p:childTnLst>
+              </p:cTn>
+              <p:prevCondLst>
+                <p:cond evt="onPrev" delay="0">
+                  <p:tgtEl>
+                    <p:sldTgt/>
+                  </p:tgtEl>
+                </p:cond>
+              </p:prevCondLst>
+              <p:nextCondLst>
+                <p:cond evt="onNext" delay="0">
+                  <p:tgtEl>
+                    <p:sldTgt/>
+                  </p:tgtEl>
+                </p:cond>
+              </p:nextCondLst>
+            </p:seq>
+          </p:childTnLst>
+        </p:cTn>
+      </p:par>
+    </p:tnLst>
+    <p:bldLst>
+      <p:bldP spid="2" grpId="0" animBg="1"/>
+      <p:bldP spid="12" grpId="0" animBg="1"/>
+    </p:bldLst>
+  </p:timing>
 </p:sld>
 </file>
 
@@ -24293,7 +25895,7 @@
           <a:p>
             <a:r>
               <a:rPr lang="it-IT" dirty="0" err="1"/>
-              <a:t>Simulations</a:t>
+              <a:t>Fluctuations</a:t>
             </a:r>
             <a:r>
               <a:rPr lang="it-IT" dirty="0"/>
@@ -24301,9 +25903,20 @@
             </a:r>
             <a:r>
               <a:rPr lang="it-IT" dirty="0" err="1"/>
-              <a:t>Results</a:t>
-            </a:r>
-            <a:endParaRPr lang="it-IT" dirty="0"/>
+              <a:t>Behaviour</a:t>
+            </a:r>
+            <a:r>
+              <a:rPr lang="it-IT" dirty="0"/>
+              <a:t> </a:t>
+            </a:r>
+            <a:r>
+              <a:rPr lang="it-IT" dirty="0" err="1"/>
+              <a:t>at</a:t>
+            </a:r>
+            <a:r>
+              <a:rPr lang="it-IT" dirty="0"/>
+              <a:t> High Re (2/2)</a:t>
+            </a:r>
           </a:p>
         </p:txBody>
       </p:sp>
@@ -24321,8 +25934,8 @@
         </p:nvSpPr>
         <p:spPr>
           <a:xfrm>
-            <a:off x="5442595" y="3922301"/>
-            <a:ext cx="3348313" cy="1015663"/>
+            <a:off x="5442595" y="4072983"/>
+            <a:ext cx="3348313" cy="646331"/>
           </a:xfrm>
           <a:prstGeom prst="rect">
             <a:avLst/>
@@ -24336,11 +25949,9 @@
           <a:lstStyle/>
           <a:p>
             <a:r>
-              <a:rPr lang="it-IT" sz="2000" b="1" dirty="0" err="1">
-                <a:solidFill>
-                  <a:schemeClr val="accent1">
-                    <a:lumMod val="50000"/>
-                  </a:schemeClr>
+              <a:rPr lang="it-IT" b="1" dirty="0" err="1">
+                <a:solidFill>
+                  <a:schemeClr val="tx2"/>
                 </a:solidFill>
                 <a:latin typeface="Arial" panose="020B0604020202020204" pitchFamily="34" charset="0"/>
                 <a:ea typeface="Cambria Math" panose="02040503050406030204" pitchFamily="18" charset="0"/>
@@ -24349,11 +25960,9 @@
               <a:t>Spanwise</a:t>
             </a:r>
             <a:r>
-              <a:rPr lang="it-IT" sz="2000" b="1" dirty="0">
-                <a:solidFill>
-                  <a:schemeClr val="accent1">
-                    <a:lumMod val="50000"/>
-                  </a:schemeClr>
+              <a:rPr lang="it-IT" b="1" dirty="0">
+                <a:solidFill>
+                  <a:schemeClr val="tx2"/>
                 </a:solidFill>
                 <a:latin typeface="Arial" panose="020B0604020202020204" pitchFamily="34" charset="0"/>
                 <a:ea typeface="Cambria Math" panose="02040503050406030204" pitchFamily="18" charset="0"/>
@@ -24362,11 +25971,9 @@
               <a:t> </a:t>
             </a:r>
             <a:r>
-              <a:rPr lang="it-IT" sz="2000" b="1" dirty="0" err="1">
-                <a:solidFill>
-                  <a:schemeClr val="accent1">
-                    <a:lumMod val="50000"/>
-                  </a:schemeClr>
+              <a:rPr lang="it-IT" b="1" dirty="0" err="1">
+                <a:solidFill>
+                  <a:schemeClr val="tx2"/>
                 </a:solidFill>
                 <a:latin typeface="Arial" panose="020B0604020202020204" pitchFamily="34" charset="0"/>
                 <a:ea typeface="Cambria Math" panose="02040503050406030204" pitchFamily="18" charset="0"/>
@@ -24375,11 +25982,9 @@
               <a:t>fluctations</a:t>
             </a:r>
             <a:r>
-              <a:rPr lang="it-IT" sz="2000" b="1" dirty="0">
-                <a:solidFill>
-                  <a:schemeClr val="accent1">
-                    <a:lumMod val="50000"/>
-                  </a:schemeClr>
+              <a:rPr lang="it-IT" b="1" dirty="0">
+                <a:solidFill>
+                  <a:schemeClr val="tx2"/>
                 </a:solidFill>
                 <a:latin typeface="Arial" panose="020B0604020202020204" pitchFamily="34" charset="0"/>
                 <a:ea typeface="Cambria Math" panose="02040503050406030204" pitchFamily="18" charset="0"/>
@@ -24388,11 +25993,9 @@
               <a:t> </a:t>
             </a:r>
             <a:r>
-              <a:rPr lang="it-IT" sz="2000" b="1" dirty="0" err="1">
-                <a:solidFill>
-                  <a:schemeClr val="accent1">
-                    <a:lumMod val="50000"/>
-                  </a:schemeClr>
+              <a:rPr lang="it-IT" b="1" dirty="0" err="1">
+                <a:solidFill>
+                  <a:schemeClr val="tx2"/>
                 </a:solidFill>
                 <a:latin typeface="Arial" panose="020B0604020202020204" pitchFamily="34" charset="0"/>
                 <a:ea typeface="Cambria Math" panose="02040503050406030204" pitchFamily="18" charset="0"/>
@@ -24401,11 +26004,9 @@
               <a:t>term</a:t>
             </a:r>
             <a:r>
-              <a:rPr lang="it-IT" sz="2000" b="1" dirty="0">
-                <a:solidFill>
-                  <a:schemeClr val="accent1">
-                    <a:lumMod val="50000"/>
-                  </a:schemeClr>
+              <a:rPr lang="it-IT" b="1" dirty="0">
+                <a:solidFill>
+                  <a:schemeClr val="tx2"/>
                 </a:solidFill>
                 <a:latin typeface="Arial" panose="020B0604020202020204" pitchFamily="34" charset="0"/>
                 <a:ea typeface="Cambria Math" panose="02040503050406030204" pitchFamily="18" charset="0"/>
@@ -24414,11 +26015,9 @@
               <a:t> </a:t>
             </a:r>
             <a:r>
-              <a:rPr lang="it-IT" sz="2000" b="1" dirty="0" err="1">
-                <a:solidFill>
-                  <a:schemeClr val="accent1">
-                    <a:lumMod val="50000"/>
-                  </a:schemeClr>
+              <a:rPr lang="it-IT" b="1" dirty="0" err="1">
+                <a:solidFill>
+                  <a:schemeClr val="tx2"/>
                 </a:solidFill>
                 <a:latin typeface="Arial" panose="020B0604020202020204" pitchFamily="34" charset="0"/>
                 <a:ea typeface="Cambria Math" panose="02040503050406030204" pitchFamily="18" charset="0"/>
@@ -24428,13 +26027,17 @@
             </a:r>
             <a:r>
               <a:rPr lang="it-IT" dirty="0">
-                <a:latin typeface="Cambria Math" panose="02040503050406030204" pitchFamily="18" charset="0"/>
+                <a:solidFill>
+                  <a:schemeClr val="tx2"/>
+                </a:solidFill>
+                <a:latin typeface="Arial" panose="020B0604020202020204" pitchFamily="34" charset="0"/>
                 <a:ea typeface="Cambria Math" panose="02040503050406030204" pitchFamily="18" charset="0"/>
+                <a:cs typeface="Arial" panose="020B0604020202020204" pitchFamily="34" charset="0"/>
               </a:rPr>
               <a:t> </a:t>
             </a:r>
             <a:r>
-              <a:rPr lang="it-IT" sz="2000" b="1" dirty="0" err="1">
+              <a:rPr lang="it-IT" b="1" dirty="0" err="1">
                 <a:solidFill>
                   <a:srgbClr val="92D050"/>
                 </a:solidFill>
@@ -24445,7 +26048,7 @@
               <a:t>logaritmic</a:t>
             </a:r>
             <a:r>
-              <a:rPr lang="it-IT" sz="2000" b="1" dirty="0">
+              <a:rPr lang="it-IT" b="1" dirty="0">
                 <a:solidFill>
                   <a:srgbClr val="92D050"/>
                 </a:solidFill>
@@ -24456,7 +26059,7 @@
               <a:t> </a:t>
             </a:r>
             <a:r>
-              <a:rPr lang="it-IT" sz="2000" b="1" dirty="0" err="1">
+              <a:rPr lang="it-IT" b="1" dirty="0" err="1">
                 <a:solidFill>
                   <a:srgbClr val="92D050"/>
                 </a:solidFill>
@@ -24466,7 +26069,7 @@
               </a:rPr>
               <a:t>behaviour</a:t>
             </a:r>
-            <a:endParaRPr lang="it-IT" sz="2000" b="1" dirty="0">
+            <a:endParaRPr lang="it-IT" b="1" dirty="0">
               <a:solidFill>
                 <a:srgbClr val="92D050"/>
               </a:solidFill>
@@ -24543,8 +26146,8 @@
         </p:nvSpPr>
         <p:spPr>
           <a:xfrm>
-            <a:off x="5442595" y="1922267"/>
-            <a:ext cx="3581729" cy="1015663"/>
+            <a:off x="5442240" y="2014600"/>
+            <a:ext cx="3581729" cy="923330"/>
           </a:xfrm>
           <a:prstGeom prst="rect">
             <a:avLst/>
@@ -24558,11 +26161,9 @@
           <a:lstStyle/>
           <a:p>
             <a:r>
-              <a:rPr lang="it-IT" sz="2000" b="1" dirty="0" err="1">
-                <a:solidFill>
-                  <a:schemeClr val="accent1">
-                    <a:lumMod val="50000"/>
-                  </a:schemeClr>
+              <a:rPr lang="it-IT" b="1" dirty="0" err="1">
+                <a:solidFill>
+                  <a:schemeClr val="tx2"/>
                 </a:solidFill>
                 <a:latin typeface="Arial" panose="020B0604020202020204" pitchFamily="34" charset="0"/>
                 <a:ea typeface="Cambria Math" panose="02040503050406030204" pitchFamily="18" charset="0"/>
@@ -24571,11 +26172,9 @@
               <a:t>Streamwise</a:t>
             </a:r>
             <a:r>
-              <a:rPr lang="it-IT" sz="2000" b="1" dirty="0">
-                <a:solidFill>
-                  <a:schemeClr val="accent1">
-                    <a:lumMod val="50000"/>
-                  </a:schemeClr>
+              <a:rPr lang="it-IT" b="1" dirty="0">
+                <a:solidFill>
+                  <a:schemeClr val="tx2"/>
                 </a:solidFill>
                 <a:latin typeface="Arial" panose="020B0604020202020204" pitchFamily="34" charset="0"/>
                 <a:ea typeface="Cambria Math" panose="02040503050406030204" pitchFamily="18" charset="0"/>
@@ -24584,11 +26183,9 @@
               <a:t> </a:t>
             </a:r>
             <a:r>
-              <a:rPr lang="it-IT" sz="2000" b="1" dirty="0" err="1">
-                <a:solidFill>
-                  <a:schemeClr val="accent1">
-                    <a:lumMod val="50000"/>
-                  </a:schemeClr>
+              <a:rPr lang="it-IT" b="1" dirty="0" err="1">
+                <a:solidFill>
+                  <a:schemeClr val="tx2"/>
                 </a:solidFill>
                 <a:latin typeface="Arial" panose="020B0604020202020204" pitchFamily="34" charset="0"/>
                 <a:ea typeface="Cambria Math" panose="02040503050406030204" pitchFamily="18" charset="0"/>
@@ -24597,11 +26194,9 @@
               <a:t>fluctuations</a:t>
             </a:r>
             <a:r>
-              <a:rPr lang="it-IT" sz="2000" b="1" dirty="0">
-                <a:solidFill>
-                  <a:schemeClr val="accent1">
-                    <a:lumMod val="50000"/>
-                  </a:schemeClr>
+              <a:rPr lang="it-IT" b="1" dirty="0">
+                <a:solidFill>
+                  <a:schemeClr val="tx2"/>
                 </a:solidFill>
                 <a:latin typeface="Arial" panose="020B0604020202020204" pitchFamily="34" charset="0"/>
                 <a:ea typeface="Cambria Math" panose="02040503050406030204" pitchFamily="18" charset="0"/>
@@ -24610,11 +26205,9 @@
               <a:t> </a:t>
             </a:r>
             <a:r>
-              <a:rPr lang="it-IT" sz="2000" b="1" dirty="0" err="1">
-                <a:solidFill>
-                  <a:schemeClr val="accent1">
-                    <a:lumMod val="50000"/>
-                  </a:schemeClr>
+              <a:rPr lang="it-IT" b="1" dirty="0" err="1">
+                <a:solidFill>
+                  <a:schemeClr val="tx2"/>
                 </a:solidFill>
                 <a:latin typeface="Arial" panose="020B0604020202020204" pitchFamily="34" charset="0"/>
                 <a:ea typeface="Cambria Math" panose="02040503050406030204" pitchFamily="18" charset="0"/>
@@ -24623,11 +26216,9 @@
               <a:t>term</a:t>
             </a:r>
             <a:r>
-              <a:rPr lang="it-IT" sz="2000" b="1" dirty="0">
-                <a:solidFill>
-                  <a:schemeClr val="accent1">
-                    <a:lumMod val="50000"/>
-                  </a:schemeClr>
+              <a:rPr lang="it-IT" b="1" dirty="0">
+                <a:solidFill>
+                  <a:schemeClr val="tx2"/>
                 </a:solidFill>
                 <a:latin typeface="Arial" panose="020B0604020202020204" pitchFamily="34" charset="0"/>
                 <a:ea typeface="Cambria Math" panose="02040503050406030204" pitchFamily="18" charset="0"/>
@@ -24636,11 +26227,9 @@
               <a:t> </a:t>
             </a:r>
             <a:r>
-              <a:rPr lang="it-IT" sz="2000" b="1" dirty="0" err="1">
-                <a:solidFill>
-                  <a:schemeClr val="accent1">
-                    <a:lumMod val="50000"/>
-                  </a:schemeClr>
+              <a:rPr lang="it-IT" b="1" dirty="0" err="1">
+                <a:solidFill>
+                  <a:schemeClr val="tx2"/>
                 </a:solidFill>
                 <a:latin typeface="Arial" panose="020B0604020202020204" pitchFamily="34" charset="0"/>
                 <a:ea typeface="Cambria Math" panose="02040503050406030204" pitchFamily="18" charset="0"/>
@@ -24649,11 +26238,9 @@
               <a:t>is</a:t>
             </a:r>
             <a:r>
-              <a:rPr lang="it-IT" sz="2000" b="1" dirty="0">
-                <a:solidFill>
-                  <a:schemeClr val="accent1">
-                    <a:lumMod val="50000"/>
-                  </a:schemeClr>
+              <a:rPr lang="it-IT" b="1" dirty="0">
+                <a:solidFill>
+                  <a:schemeClr val="tx2"/>
                 </a:solidFill>
                 <a:latin typeface="Arial" panose="020B0604020202020204" pitchFamily="34" charset="0"/>
                 <a:ea typeface="Cambria Math" panose="02040503050406030204" pitchFamily="18" charset="0"/>
@@ -24662,11 +26249,9 @@
               <a:t> </a:t>
             </a:r>
             <a:r>
-              <a:rPr lang="it-IT" sz="2000" b="1" dirty="0" err="1">
-                <a:solidFill>
-                  <a:schemeClr val="accent1">
-                    <a:lumMod val="50000"/>
-                  </a:schemeClr>
+              <a:rPr lang="it-IT" b="1" dirty="0" err="1">
+                <a:solidFill>
+                  <a:schemeClr val="tx2"/>
                 </a:solidFill>
                 <a:latin typeface="Arial" panose="020B0604020202020204" pitchFamily="34" charset="0"/>
                 <a:ea typeface="Cambria Math" panose="02040503050406030204" pitchFamily="18" charset="0"/>
@@ -24675,11 +26260,9 @@
               <a:t>close</a:t>
             </a:r>
             <a:r>
-              <a:rPr lang="it-IT" sz="2000" b="1" dirty="0">
-                <a:solidFill>
-                  <a:schemeClr val="accent1">
-                    <a:lumMod val="50000"/>
-                  </a:schemeClr>
+              <a:rPr lang="it-IT" b="1" dirty="0">
+                <a:solidFill>
+                  <a:schemeClr val="tx2"/>
                 </a:solidFill>
                 <a:latin typeface="Arial" panose="020B0604020202020204" pitchFamily="34" charset="0"/>
                 <a:ea typeface="Cambria Math" panose="02040503050406030204" pitchFamily="18" charset="0"/>
@@ -24688,11 +26271,9 @@
               <a:t> to </a:t>
             </a:r>
             <a:r>
-              <a:rPr lang="it-IT" sz="2000" b="1" dirty="0" err="1">
-                <a:solidFill>
-                  <a:schemeClr val="accent1">
-                    <a:lumMod val="50000"/>
-                  </a:schemeClr>
+              <a:rPr lang="it-IT" b="1" dirty="0" err="1">
+                <a:solidFill>
+                  <a:schemeClr val="tx2"/>
                 </a:solidFill>
                 <a:latin typeface="Arial" panose="020B0604020202020204" pitchFamily="34" charset="0"/>
                 <a:ea typeface="Cambria Math" panose="02040503050406030204" pitchFamily="18" charset="0"/>
@@ -24701,11 +26282,9 @@
               <a:t>develop</a:t>
             </a:r>
             <a:r>
-              <a:rPr lang="it-IT" sz="2000" b="1" dirty="0">
-                <a:solidFill>
-                  <a:schemeClr val="accent1">
-                    <a:lumMod val="50000"/>
-                  </a:schemeClr>
+              <a:rPr lang="it-IT" b="1" dirty="0">
+                <a:solidFill>
+                  <a:schemeClr val="tx2"/>
                 </a:solidFill>
                 <a:latin typeface="Arial" panose="020B0604020202020204" pitchFamily="34" charset="0"/>
                 <a:ea typeface="Cambria Math" panose="02040503050406030204" pitchFamily="18" charset="0"/>
@@ -24714,11 +26293,9 @@
               <a:t> a </a:t>
             </a:r>
             <a:r>
-              <a:rPr lang="it-IT" sz="2000" b="1" dirty="0" err="1">
-                <a:solidFill>
-                  <a:schemeClr val="accent1">
-                    <a:lumMod val="50000"/>
-                  </a:schemeClr>
+              <a:rPr lang="it-IT" b="1" dirty="0" err="1">
+                <a:solidFill>
+                  <a:schemeClr val="tx2"/>
                 </a:solidFill>
                 <a:latin typeface="Arial" panose="020B0604020202020204" pitchFamily="34" charset="0"/>
                 <a:ea typeface="Cambria Math" panose="02040503050406030204" pitchFamily="18" charset="0"/>
@@ -24727,11 +26304,9 @@
               <a:t>logarithmic</a:t>
             </a:r>
             <a:r>
-              <a:rPr lang="it-IT" sz="2000" b="1" dirty="0">
-                <a:solidFill>
-                  <a:schemeClr val="accent1">
-                    <a:lumMod val="50000"/>
-                  </a:schemeClr>
+              <a:rPr lang="it-IT" b="1" dirty="0">
+                <a:solidFill>
+                  <a:schemeClr val="tx2"/>
                 </a:solidFill>
                 <a:latin typeface="Arial" panose="020B0604020202020204" pitchFamily="34" charset="0"/>
                 <a:ea typeface="Cambria Math" panose="02040503050406030204" pitchFamily="18" charset="0"/>
@@ -24740,11 +26315,9 @@
               <a:t> </a:t>
             </a:r>
             <a:r>
-              <a:rPr lang="it-IT" sz="2000" b="1" dirty="0" err="1">
-                <a:solidFill>
-                  <a:schemeClr val="accent1">
-                    <a:lumMod val="50000"/>
-                  </a:schemeClr>
+              <a:rPr lang="it-IT" b="1" dirty="0" err="1">
+                <a:solidFill>
+                  <a:schemeClr val="tx2"/>
                 </a:solidFill>
                 <a:latin typeface="Arial" panose="020B0604020202020204" pitchFamily="34" charset="0"/>
                 <a:ea typeface="Cambria Math" panose="02040503050406030204" pitchFamily="18" charset="0"/>
@@ -24753,11 +26326,9 @@
               <a:t>behaviour</a:t>
             </a:r>
             <a:r>
-              <a:rPr lang="it-IT" sz="2000" b="1" dirty="0">
-                <a:solidFill>
-                  <a:schemeClr val="accent1">
-                    <a:lumMod val="50000"/>
-                  </a:schemeClr>
+              <a:rPr lang="it-IT" b="1" dirty="0">
+                <a:solidFill>
+                  <a:schemeClr val="tx2"/>
                 </a:solidFill>
                 <a:latin typeface="Arial" panose="020B0604020202020204" pitchFamily="34" charset="0"/>
                 <a:ea typeface="Cambria Math" panose="02040503050406030204" pitchFamily="18" charset="0"/>
@@ -24766,9 +26337,13 @@
               <a:t> 	</a:t>
             </a:r>
             <a:r>
-              <a:rPr lang="it-IT" sz="2000" dirty="0">
-                <a:latin typeface="Cambria Math" panose="02040503050406030204" pitchFamily="18" charset="0"/>
+              <a:rPr lang="it-IT" dirty="0">
+                <a:solidFill>
+                  <a:schemeClr val="tx2"/>
+                </a:solidFill>
+                <a:latin typeface="Arial" panose="020B0604020202020204" pitchFamily="34" charset="0"/>
                 <a:ea typeface="Cambria Math" panose="02040503050406030204" pitchFamily="18" charset="0"/>
+                <a:cs typeface="Arial" panose="020B0604020202020204" pitchFamily="34" charset="0"/>
               </a:rPr>
               <a:t>	</a:t>
             </a:r>
@@ -24789,7 +26364,7 @@
         </p:nvSpPr>
         <p:spPr>
           <a:xfrm>
-            <a:off x="5443432" y="3014921"/>
+            <a:off x="5442240" y="3112125"/>
             <a:ext cx="683842" cy="393331"/>
           </a:xfrm>
           <a:prstGeom prst="rightArrow">
@@ -24833,8 +26408,8 @@
         </p:nvSpPr>
         <p:spPr>
           <a:xfrm>
-            <a:off x="6275915" y="3014921"/>
-            <a:ext cx="2366353" cy="400110"/>
+            <a:off x="6274723" y="3124125"/>
+            <a:ext cx="2146742" cy="369332"/>
           </a:xfrm>
           <a:prstGeom prst="rect">
             <a:avLst/>
@@ -24848,11 +26423,9 @@
           <a:lstStyle/>
           <a:p>
             <a:r>
-              <a:rPr lang="it-IT" sz="2000" b="1" dirty="0" err="1">
-                <a:solidFill>
-                  <a:schemeClr val="accent1">
-                    <a:lumMod val="50000"/>
-                  </a:schemeClr>
+              <a:rPr lang="it-IT" b="1" dirty="0" err="1">
+                <a:solidFill>
+                  <a:schemeClr val="tx2"/>
                 </a:solidFill>
                 <a:latin typeface="Arial" panose="020B0604020202020204" pitchFamily="34" charset="0"/>
                 <a:ea typeface="Cambria Math" panose="02040503050406030204" pitchFamily="18" charset="0"/>
@@ -24861,11 +26434,9 @@
               <a:t>Higher</a:t>
             </a:r>
             <a:r>
-              <a:rPr lang="it-IT" sz="2000" b="1" dirty="0">
-                <a:solidFill>
-                  <a:schemeClr val="accent1">
-                    <a:lumMod val="50000"/>
-                  </a:schemeClr>
+              <a:rPr lang="it-IT" b="1" dirty="0">
+                <a:solidFill>
+                  <a:schemeClr val="tx2"/>
                 </a:solidFill>
                 <a:latin typeface="Arial" panose="020B0604020202020204" pitchFamily="34" charset="0"/>
                 <a:ea typeface="Cambria Math" panose="02040503050406030204" pitchFamily="18" charset="0"/>
@@ -24874,11 +26445,9 @@
               <a:t> Re </a:t>
             </a:r>
             <a:r>
-              <a:rPr lang="it-IT" sz="2000" b="1" dirty="0" err="1">
-                <a:solidFill>
-                  <a:schemeClr val="accent1">
-                    <a:lumMod val="50000"/>
-                  </a:schemeClr>
+              <a:rPr lang="it-IT" b="1" dirty="0" err="1">
+                <a:solidFill>
+                  <a:schemeClr val="tx2"/>
                 </a:solidFill>
                 <a:latin typeface="Arial" panose="020B0604020202020204" pitchFamily="34" charset="0"/>
                 <a:ea typeface="Cambria Math" panose="02040503050406030204" pitchFamily="18" charset="0"/>
@@ -24886,11 +26455,9 @@
               </a:rPr>
               <a:t>needed</a:t>
             </a:r>
-            <a:endParaRPr lang="it-IT" sz="2000" b="1" dirty="0">
-              <a:solidFill>
-                <a:schemeClr val="accent1">
-                  <a:lumMod val="50000"/>
-                </a:schemeClr>
+            <a:endParaRPr lang="it-IT" b="1" dirty="0">
+              <a:solidFill>
+                <a:schemeClr val="tx2"/>
               </a:solidFill>
               <a:latin typeface="Arial" panose="020B0604020202020204" pitchFamily="34" charset="0"/>
               <a:ea typeface="Cambria Math" panose="02040503050406030204" pitchFamily="18" charset="0"/>
@@ -25093,9 +26660,6 @@
                     <p:cTn id="3" fill="hold">
                       <p:stCondLst>
                         <p:cond delay="indefinite"/>
-                        <p:cond evt="onBegin" delay="0">
-                          <p:tn val="2"/>
-                        </p:cond>
                       </p:stCondLst>
                       <p:childTnLst>
                         <p:par>
@@ -25105,7 +26669,7 @@
                             </p:stCondLst>
                             <p:childTnLst>
                               <p:par>
-                                <p:cTn id="5" presetID="2" presetClass="entr" presetSubtype="4" fill="hold" grpId="0" nodeType="afterEffect">
+                                <p:cTn id="5" presetID="12" presetClass="entr" presetSubtype="8" fill="hold" grpId="0" nodeType="clickEffect">
                                   <p:stCondLst>
                                     <p:cond delay="0"/>
                                   </p:stCondLst>
@@ -25113,480 +26677,6 @@
                                     <p:set>
                                       <p:cBhvr>
                                         <p:cTn id="6" dur="1" fill="hold">
-                                          <p:stCondLst>
-                                            <p:cond delay="0"/>
-                                          </p:stCondLst>
-                                        </p:cTn>
-                                        <p:tgtEl>
-                                          <p:spTgt spid="14"/>
-                                        </p:tgtEl>
-                                        <p:attrNameLst>
-                                          <p:attrName>style.visibility</p:attrName>
-                                        </p:attrNameLst>
-                                      </p:cBhvr>
-                                      <p:to>
-                                        <p:strVal val="visible"/>
-                                      </p:to>
-                                    </p:set>
-                                    <p:anim calcmode="lin" valueType="num">
-                                      <p:cBhvr additive="base">
-                                        <p:cTn id="7" dur="500" fill="hold"/>
-                                        <p:tgtEl>
-                                          <p:spTgt spid="14"/>
-                                        </p:tgtEl>
-                                        <p:attrNameLst>
-                                          <p:attrName>ppt_x</p:attrName>
-                                        </p:attrNameLst>
-                                      </p:cBhvr>
-                                      <p:tavLst>
-                                        <p:tav tm="0">
-                                          <p:val>
-                                            <p:strVal val="#ppt_x"/>
-                                          </p:val>
-                                        </p:tav>
-                                        <p:tav tm="100000">
-                                          <p:val>
-                                            <p:strVal val="#ppt_x"/>
-                                          </p:val>
-                                        </p:tav>
-                                      </p:tavLst>
-                                    </p:anim>
-                                    <p:anim calcmode="lin" valueType="num">
-                                      <p:cBhvr additive="base">
-                                        <p:cTn id="8" dur="500" fill="hold"/>
-                                        <p:tgtEl>
-                                          <p:spTgt spid="14"/>
-                                        </p:tgtEl>
-                                        <p:attrNameLst>
-                                          <p:attrName>ppt_y</p:attrName>
-                                        </p:attrNameLst>
-                                      </p:cBhvr>
-                                      <p:tavLst>
-                                        <p:tav tm="0">
-                                          <p:val>
-                                            <p:strVal val="1+#ppt_h/2"/>
-                                          </p:val>
-                                        </p:tav>
-                                        <p:tav tm="100000">
-                                          <p:val>
-                                            <p:strVal val="#ppt_y"/>
-                                          </p:val>
-                                        </p:tav>
-                                      </p:tavLst>
-                                    </p:anim>
-                                  </p:childTnLst>
-                                </p:cTn>
-                              </p:par>
-                              <p:par>
-                                <p:cTn id="9" presetID="2" presetClass="entr" presetSubtype="4" fill="hold" grpId="0" nodeType="withEffect">
-                                  <p:stCondLst>
-                                    <p:cond delay="0"/>
-                                  </p:stCondLst>
-                                  <p:childTnLst>
-                                    <p:set>
-                                      <p:cBhvr>
-                                        <p:cTn id="10" dur="1" fill="hold">
-                                          <p:stCondLst>
-                                            <p:cond delay="0"/>
-                                          </p:stCondLst>
-                                        </p:cTn>
-                                        <p:tgtEl>
-                                          <p:spTgt spid="24"/>
-                                        </p:tgtEl>
-                                        <p:attrNameLst>
-                                          <p:attrName>style.visibility</p:attrName>
-                                        </p:attrNameLst>
-                                      </p:cBhvr>
-                                      <p:to>
-                                        <p:strVal val="visible"/>
-                                      </p:to>
-                                    </p:set>
-                                    <p:anim calcmode="lin" valueType="num">
-                                      <p:cBhvr additive="base">
-                                        <p:cTn id="11" dur="500" fill="hold"/>
-                                        <p:tgtEl>
-                                          <p:spTgt spid="24"/>
-                                        </p:tgtEl>
-                                        <p:attrNameLst>
-                                          <p:attrName>ppt_x</p:attrName>
-                                        </p:attrNameLst>
-                                      </p:cBhvr>
-                                      <p:tavLst>
-                                        <p:tav tm="0">
-                                          <p:val>
-                                            <p:strVal val="#ppt_x"/>
-                                          </p:val>
-                                        </p:tav>
-                                        <p:tav tm="100000">
-                                          <p:val>
-                                            <p:strVal val="#ppt_x"/>
-                                          </p:val>
-                                        </p:tav>
-                                      </p:tavLst>
-                                    </p:anim>
-                                    <p:anim calcmode="lin" valueType="num">
-                                      <p:cBhvr additive="base">
-                                        <p:cTn id="12" dur="500" fill="hold"/>
-                                        <p:tgtEl>
-                                          <p:spTgt spid="24"/>
-                                        </p:tgtEl>
-                                        <p:attrNameLst>
-                                          <p:attrName>ppt_y</p:attrName>
-                                        </p:attrNameLst>
-                                      </p:cBhvr>
-                                      <p:tavLst>
-                                        <p:tav tm="0">
-                                          <p:val>
-                                            <p:strVal val="1+#ppt_h/2"/>
-                                          </p:val>
-                                        </p:tav>
-                                        <p:tav tm="100000">
-                                          <p:val>
-                                            <p:strVal val="#ppt_y"/>
-                                          </p:val>
-                                        </p:tav>
-                                      </p:tavLst>
-                                    </p:anim>
-                                  </p:childTnLst>
-                                </p:cTn>
-                              </p:par>
-                              <p:par>
-                                <p:cTn id="13" presetID="2" presetClass="entr" presetSubtype="4" fill="hold" grpId="0" nodeType="withEffect">
-                                  <p:stCondLst>
-                                    <p:cond delay="0"/>
-                                  </p:stCondLst>
-                                  <p:childTnLst>
-                                    <p:set>
-                                      <p:cBhvr>
-                                        <p:cTn id="14" dur="1" fill="hold">
-                                          <p:stCondLst>
-                                            <p:cond delay="0"/>
-                                          </p:stCondLst>
-                                        </p:cTn>
-                                        <p:tgtEl>
-                                          <p:spTgt spid="2"/>
-                                        </p:tgtEl>
-                                        <p:attrNameLst>
-                                          <p:attrName>style.visibility</p:attrName>
-                                        </p:attrNameLst>
-                                      </p:cBhvr>
-                                      <p:to>
-                                        <p:strVal val="visible"/>
-                                      </p:to>
-                                    </p:set>
-                                    <p:anim calcmode="lin" valueType="num">
-                                      <p:cBhvr additive="base">
-                                        <p:cTn id="15" dur="500" fill="hold"/>
-                                        <p:tgtEl>
-                                          <p:spTgt spid="2"/>
-                                        </p:tgtEl>
-                                        <p:attrNameLst>
-                                          <p:attrName>ppt_x</p:attrName>
-                                        </p:attrNameLst>
-                                      </p:cBhvr>
-                                      <p:tavLst>
-                                        <p:tav tm="0">
-                                          <p:val>
-                                            <p:strVal val="#ppt_x"/>
-                                          </p:val>
-                                        </p:tav>
-                                        <p:tav tm="100000">
-                                          <p:val>
-                                            <p:strVal val="#ppt_x"/>
-                                          </p:val>
-                                        </p:tav>
-                                      </p:tavLst>
-                                    </p:anim>
-                                    <p:anim calcmode="lin" valueType="num">
-                                      <p:cBhvr additive="base">
-                                        <p:cTn id="16" dur="500" fill="hold"/>
-                                        <p:tgtEl>
-                                          <p:spTgt spid="2"/>
-                                        </p:tgtEl>
-                                        <p:attrNameLst>
-                                          <p:attrName>ppt_y</p:attrName>
-                                        </p:attrNameLst>
-                                      </p:cBhvr>
-                                      <p:tavLst>
-                                        <p:tav tm="0">
-                                          <p:val>
-                                            <p:strVal val="1+#ppt_h/2"/>
-                                          </p:val>
-                                        </p:tav>
-                                        <p:tav tm="100000">
-                                          <p:val>
-                                            <p:strVal val="#ppt_y"/>
-                                          </p:val>
-                                        </p:tav>
-                                      </p:tavLst>
-                                    </p:anim>
-                                  </p:childTnLst>
-                                </p:cTn>
-                              </p:par>
-                            </p:childTnLst>
-                          </p:cTn>
-                        </p:par>
-                      </p:childTnLst>
-                    </p:cTn>
-                  </p:par>
-                  <p:par>
-                    <p:cTn id="17" fill="hold">
-                      <p:stCondLst>
-                        <p:cond delay="indefinite"/>
-                      </p:stCondLst>
-                      <p:childTnLst>
-                        <p:par>
-                          <p:cTn id="18" fill="hold">
-                            <p:stCondLst>
-                              <p:cond delay="0"/>
-                            </p:stCondLst>
-                            <p:childTnLst>
-                              <p:par>
-                                <p:cTn id="19" presetID="2" presetClass="entr" presetSubtype="4" fill="hold" grpId="0" nodeType="clickEffect">
-                                  <p:stCondLst>
-                                    <p:cond delay="0"/>
-                                  </p:stCondLst>
-                                  <p:childTnLst>
-                                    <p:set>
-                                      <p:cBhvr>
-                                        <p:cTn id="20" dur="1" fill="hold">
-                                          <p:stCondLst>
-                                            <p:cond delay="0"/>
-                                          </p:stCondLst>
-                                        </p:cTn>
-                                        <p:tgtEl>
-                                          <p:spTgt spid="16"/>
-                                        </p:tgtEl>
-                                        <p:attrNameLst>
-                                          <p:attrName>style.visibility</p:attrName>
-                                        </p:attrNameLst>
-                                      </p:cBhvr>
-                                      <p:to>
-                                        <p:strVal val="visible"/>
-                                      </p:to>
-                                    </p:set>
-                                    <p:anim calcmode="lin" valueType="num">
-                                      <p:cBhvr additive="base">
-                                        <p:cTn id="21" dur="500" fill="hold"/>
-                                        <p:tgtEl>
-                                          <p:spTgt spid="16"/>
-                                        </p:tgtEl>
-                                        <p:attrNameLst>
-                                          <p:attrName>ppt_x</p:attrName>
-                                        </p:attrNameLst>
-                                      </p:cBhvr>
-                                      <p:tavLst>
-                                        <p:tav tm="0">
-                                          <p:val>
-                                            <p:strVal val="#ppt_x"/>
-                                          </p:val>
-                                        </p:tav>
-                                        <p:tav tm="100000">
-                                          <p:val>
-                                            <p:strVal val="#ppt_x"/>
-                                          </p:val>
-                                        </p:tav>
-                                      </p:tavLst>
-                                    </p:anim>
-                                    <p:anim calcmode="lin" valueType="num">
-                                      <p:cBhvr additive="base">
-                                        <p:cTn id="22" dur="500" fill="hold"/>
-                                        <p:tgtEl>
-                                          <p:spTgt spid="16"/>
-                                        </p:tgtEl>
-                                        <p:attrNameLst>
-                                          <p:attrName>ppt_y</p:attrName>
-                                        </p:attrNameLst>
-                                      </p:cBhvr>
-                                      <p:tavLst>
-                                        <p:tav tm="0">
-                                          <p:val>
-                                            <p:strVal val="1+#ppt_h/2"/>
-                                          </p:val>
-                                        </p:tav>
-                                        <p:tav tm="100000">
-                                          <p:val>
-                                            <p:strVal val="#ppt_y"/>
-                                          </p:val>
-                                        </p:tav>
-                                      </p:tavLst>
-                                    </p:anim>
-                                  </p:childTnLst>
-                                </p:cTn>
-                              </p:par>
-                              <p:par>
-                                <p:cTn id="23" presetID="2" presetClass="entr" presetSubtype="4" fill="hold" grpId="0" nodeType="withEffect">
-                                  <p:stCondLst>
-                                    <p:cond delay="0"/>
-                                  </p:stCondLst>
-                                  <p:childTnLst>
-                                    <p:set>
-                                      <p:cBhvr>
-                                        <p:cTn id="24" dur="1" fill="hold">
-                                          <p:stCondLst>
-                                            <p:cond delay="0"/>
-                                          </p:stCondLst>
-                                        </p:cTn>
-                                        <p:tgtEl>
-                                          <p:spTgt spid="23"/>
-                                        </p:tgtEl>
-                                        <p:attrNameLst>
-                                          <p:attrName>style.visibility</p:attrName>
-                                        </p:attrNameLst>
-                                      </p:cBhvr>
-                                      <p:to>
-                                        <p:strVal val="visible"/>
-                                      </p:to>
-                                    </p:set>
-                                    <p:anim calcmode="lin" valueType="num">
-                                      <p:cBhvr additive="base">
-                                        <p:cTn id="25" dur="500" fill="hold"/>
-                                        <p:tgtEl>
-                                          <p:spTgt spid="23"/>
-                                        </p:tgtEl>
-                                        <p:attrNameLst>
-                                          <p:attrName>ppt_x</p:attrName>
-                                        </p:attrNameLst>
-                                      </p:cBhvr>
-                                      <p:tavLst>
-                                        <p:tav tm="0">
-                                          <p:val>
-                                            <p:strVal val="#ppt_x"/>
-                                          </p:val>
-                                        </p:tav>
-                                        <p:tav tm="100000">
-                                          <p:val>
-                                            <p:strVal val="#ppt_x"/>
-                                          </p:val>
-                                        </p:tav>
-                                      </p:tavLst>
-                                    </p:anim>
-                                    <p:anim calcmode="lin" valueType="num">
-                                      <p:cBhvr additive="base">
-                                        <p:cTn id="26" dur="500" fill="hold"/>
-                                        <p:tgtEl>
-                                          <p:spTgt spid="23"/>
-                                        </p:tgtEl>
-                                        <p:attrNameLst>
-                                          <p:attrName>ppt_y</p:attrName>
-                                        </p:attrNameLst>
-                                      </p:cBhvr>
-                                      <p:tavLst>
-                                        <p:tav tm="0">
-                                          <p:val>
-                                            <p:strVal val="1+#ppt_h/2"/>
-                                          </p:val>
-                                        </p:tav>
-                                        <p:tav tm="100000">
-                                          <p:val>
-                                            <p:strVal val="#ppt_y"/>
-                                          </p:val>
-                                        </p:tav>
-                                      </p:tavLst>
-                                    </p:anim>
-                                  </p:childTnLst>
-                                </p:cTn>
-                              </p:par>
-                              <p:par>
-                                <p:cTn id="27" presetID="2" presetClass="entr" presetSubtype="4" fill="hold" grpId="0" nodeType="withEffect">
-                                  <p:stCondLst>
-                                    <p:cond delay="0"/>
-                                  </p:stCondLst>
-                                  <p:childTnLst>
-                                    <p:set>
-                                      <p:cBhvr>
-                                        <p:cTn id="28" dur="1" fill="hold">
-                                          <p:stCondLst>
-                                            <p:cond delay="0"/>
-                                          </p:stCondLst>
-                                        </p:cTn>
-                                        <p:tgtEl>
-                                          <p:spTgt spid="18"/>
-                                        </p:tgtEl>
-                                        <p:attrNameLst>
-                                          <p:attrName>style.visibility</p:attrName>
-                                        </p:attrNameLst>
-                                      </p:cBhvr>
-                                      <p:to>
-                                        <p:strVal val="visible"/>
-                                      </p:to>
-                                    </p:set>
-                                    <p:anim calcmode="lin" valueType="num">
-                                      <p:cBhvr additive="base">
-                                        <p:cTn id="29" dur="500" fill="hold"/>
-                                        <p:tgtEl>
-                                          <p:spTgt spid="18"/>
-                                        </p:tgtEl>
-                                        <p:attrNameLst>
-                                          <p:attrName>ppt_x</p:attrName>
-                                        </p:attrNameLst>
-                                      </p:cBhvr>
-                                      <p:tavLst>
-                                        <p:tav tm="0">
-                                          <p:val>
-                                            <p:strVal val="#ppt_x"/>
-                                          </p:val>
-                                        </p:tav>
-                                        <p:tav tm="100000">
-                                          <p:val>
-                                            <p:strVal val="#ppt_x"/>
-                                          </p:val>
-                                        </p:tav>
-                                      </p:tavLst>
-                                    </p:anim>
-                                    <p:anim calcmode="lin" valueType="num">
-                                      <p:cBhvr additive="base">
-                                        <p:cTn id="30" dur="500" fill="hold"/>
-                                        <p:tgtEl>
-                                          <p:spTgt spid="18"/>
-                                        </p:tgtEl>
-                                        <p:attrNameLst>
-                                          <p:attrName>ppt_y</p:attrName>
-                                        </p:attrNameLst>
-                                      </p:cBhvr>
-                                      <p:tavLst>
-                                        <p:tav tm="0">
-                                          <p:val>
-                                            <p:strVal val="1+#ppt_h/2"/>
-                                          </p:val>
-                                        </p:tav>
-                                        <p:tav tm="100000">
-                                          <p:val>
-                                            <p:strVal val="#ppt_y"/>
-                                          </p:val>
-                                        </p:tav>
-                                      </p:tavLst>
-                                    </p:anim>
-                                  </p:childTnLst>
-                                </p:cTn>
-                              </p:par>
-                            </p:childTnLst>
-                          </p:cTn>
-                        </p:par>
-                      </p:childTnLst>
-                    </p:cTn>
-                  </p:par>
-                  <p:par>
-                    <p:cTn id="31" fill="hold">
-                      <p:stCondLst>
-                        <p:cond delay="indefinite"/>
-                      </p:stCondLst>
-                      <p:childTnLst>
-                        <p:par>
-                          <p:cTn id="32" fill="hold">
-                            <p:stCondLst>
-                              <p:cond delay="0"/>
-                            </p:stCondLst>
-                            <p:childTnLst>
-                              <p:par>
-                                <p:cTn id="33" presetID="12" presetClass="entr" presetSubtype="8" fill="hold" grpId="0" nodeType="clickEffect">
-                                  <p:stCondLst>
-                                    <p:cond delay="0"/>
-                                  </p:stCondLst>
-                                  <p:childTnLst>
-                                    <p:set>
-                                      <p:cBhvr>
-                                        <p:cTn id="34" dur="1" fill="hold">
                                           <p:stCondLst>
                                             <p:cond delay="0"/>
                                           </p:stCondLst>
@@ -25604,7 +26694,7 @@
                                     </p:set>
                                     <p:anim calcmode="lin" valueType="num">
                                       <p:cBhvr additive="base">
-                                        <p:cTn id="35" dur="500"/>
+                                        <p:cTn id="7" dur="500"/>
                                         <p:tgtEl>
                                           <p:spTgt spid="17"/>
                                         </p:tgtEl>
@@ -25627,7 +26717,7 @@
                                     </p:anim>
                                     <p:animEffect transition="in" filter="wipe(right)">
                                       <p:cBhvr>
-                                        <p:cTn id="36" dur="500"/>
+                                        <p:cTn id="8" dur="500"/>
                                         <p:tgtEl>
                                           <p:spTgt spid="17"/>
                                         </p:tgtEl>
@@ -25637,14 +26727,14 @@
                                 </p:cTn>
                               </p:par>
                               <p:par>
-                                <p:cTn id="37" presetID="12" presetClass="entr" presetSubtype="8" fill="hold" grpId="0" nodeType="withEffect">
+                                <p:cTn id="9" presetID="12" presetClass="entr" presetSubtype="8" fill="hold" grpId="0" nodeType="withEffect">
                                   <p:stCondLst>
                                     <p:cond delay="0"/>
                                   </p:stCondLst>
                                   <p:childTnLst>
                                     <p:set>
                                       <p:cBhvr>
-                                        <p:cTn id="38" dur="1" fill="hold">
+                                        <p:cTn id="10" dur="1" fill="hold">
                                           <p:stCondLst>
                                             <p:cond delay="0"/>
                                           </p:stCondLst>
@@ -25662,7 +26752,7 @@
                                     </p:set>
                                     <p:anim calcmode="lin" valueType="num">
                                       <p:cBhvr additive="base">
-                                        <p:cTn id="39" dur="500"/>
+                                        <p:cTn id="11" dur="500"/>
                                         <p:tgtEl>
                                           <p:spTgt spid="21"/>
                                         </p:tgtEl>
@@ -25685,7 +26775,7 @@
                                     </p:anim>
                                     <p:animEffect transition="in" filter="wipe(right)">
                                       <p:cBhvr>
-                                        <p:cTn id="40" dur="500"/>
+                                        <p:cTn id="12" dur="500"/>
                                         <p:tgtEl>
                                           <p:spTgt spid="21"/>
                                         </p:tgtEl>
@@ -25722,14 +26812,8 @@
       </p:par>
     </p:tnLst>
     <p:bldLst>
-      <p:bldP spid="2" grpId="0"/>
-      <p:bldP spid="14" grpId="0" animBg="1"/>
-      <p:bldP spid="16" grpId="0"/>
       <p:bldP spid="17" grpId="0" animBg="1"/>
       <p:bldP spid="21" grpId="0"/>
-      <p:bldP spid="18" grpId="0" animBg="1"/>
-      <p:bldP spid="23" grpId="0" animBg="1"/>
-      <p:bldP spid="24" grpId="0" animBg="1"/>
     </p:bldLst>
   </p:timing>
 </p:sld>

</xml_diff>